<commit_message>
This is for the tutorial
</commit_message>
<xml_diff>
--- a/Progress_Presentation.pptx
+++ b/Progress_Presentation.pptx
@@ -3119,7 +3119,7 @@
             </a:pPr>
             <a:r>
               <a:rPr/>
-              <a:t>Untitled</a:t>
+              <a:t>Sleep Disorder Prediction</a:t>
             </a:r>
           </a:p>
         </p:txBody>
@@ -3219,7 +3219,7 @@
             </a:pPr>
             <a:r>
               <a:rPr/>
-              <a:t>R Markdown</a:t>
+              <a:t>Slide with Bullets</a:t>
             </a:r>
           </a:p>
         </p:txBody>
@@ -3239,39 +3239,24 @@
           <a:bodyPr/>
           <a:lstStyle/>
           <a:p>
-            <a:pPr lvl="0" indent="0" marL="0">
-              <a:buNone/>
-            </a:pPr>
+            <a:pPr lvl="0"/>
             <a:r>
               <a:rPr/>
-              <a:t>This is an R Markdown presentation. Markdown is a simple formatting syntax for authoring HTML, PDF, and MS Word documents. For more details on using R Markdown see </a:t>
-            </a:r>
-            <a:r>
-              <a:rPr>
-                <a:hlinkClick r:id="rId2"/>
-              </a:rPr>
-              <a:t>http://rmarkdown.rstudio.com</a:t>
-            </a:r>
+              <a:t>Bullet 1</a:t>
+            </a:r>
+          </a:p>
+          <a:p>
+            <a:pPr lvl="0"/>
             <a:r>
               <a:rPr/>
-              <a:t>.</a:t>
-            </a:r>
-          </a:p>
-          <a:p>
-            <a:pPr lvl="0" indent="0" marL="0">
-              <a:buNone/>
-            </a:pPr>
+              <a:t>Bullet 2</a:t>
+            </a:r>
+          </a:p>
+          <a:p>
+            <a:pPr lvl="0"/>
             <a:r>
               <a:rPr/>
-              <a:t>When you click the </a:t>
-            </a:r>
-            <a:r>
-              <a:rPr b="1"/>
-              <a:t>Knit</a:t>
-            </a:r>
-            <a:r>
-              <a:rPr/>
-              <a:t> button a document will be generated that includes both content as well as the output of any embedded R code chunks within the document.</a:t>
+              <a:t>Bullet 3</a:t>
             </a:r>
           </a:p>
         </p:txBody>
@@ -3318,7 +3303,7 @@
             </a:pPr>
             <a:r>
               <a:rPr/>
-              <a:t>Slide with Bullets</a:t>
+              <a:t>Slide with R Output</a:t>
             </a:r>
           </a:p>
         </p:txBody>
@@ -3338,93 +3323,19 @@
           <a:bodyPr/>
           <a:lstStyle/>
           <a:p>
-            <a:pPr lvl="0"/>
-            <a:r>
-              <a:rPr/>
-              <a:t>Bullet 1</a:t>
-            </a:r>
-          </a:p>
-          <a:p>
-            <a:pPr lvl="0"/>
-            <a:r>
-              <a:rPr/>
-              <a:t>Bullet 2</a:t>
-            </a:r>
-          </a:p>
-          <a:p>
-            <a:pPr lvl="0"/>
-            <a:r>
-              <a:rPr/>
-              <a:t>Bullet 3</a:t>
-            </a:r>
-          </a:p>
-        </p:txBody>
-      </p:sp>
-    </p:spTree>
-  </p:cSld>
-</p:sld>
-</file>
-
-<file path=ppt/slides/slide4.xml><?xml version="1.0" encoding="utf-8"?>
-<p:sld xmlns:a="http://schemas.openxmlformats.org/drawingml/2006/main" xmlns:r="http://schemas.openxmlformats.org/officeDocument/2006/relationships" xmlns:p="http://schemas.openxmlformats.org/presentationml/2006/main">
-  <p:cSld>
-    <p:spTree>
-      <p:nvGrpSpPr>
-        <p:cNvPr id="1" name=""/>
-        <p:cNvGrpSpPr/>
-        <p:nvPr/>
-      </p:nvGrpSpPr>
-      <p:grpSpPr>
-        <a:xfrm>
-          <a:off x="0" y="0"/>
-          <a:ext cx="0" cy="0"/>
-          <a:chOff x="0" y="0"/>
-          <a:chExt cx="0" cy="0"/>
-        </a:xfrm>
-      </p:grpSpPr>
-      <p:sp>
-        <p:nvSpPr>
-          <p:cNvPr id="2" name="Title 1"/>
-          <p:cNvSpPr>
-            <a:spLocks noGrp="1"/>
-          </p:cNvSpPr>
-          <p:nvPr>
-            <p:ph type="title"/>
-          </p:nvPr>
-        </p:nvSpPr>
-        <p:spPr/>
-        <p:txBody>
-          <a:bodyPr/>
-          <a:lstStyle/>
-          <a:p>
-            <a:pPr lvl="0" indent="0" marL="0">
+            <a:pPr lvl="0" indent="0">
               <a:buNone/>
             </a:pPr>
             <a:r>
-              <a:rPr/>
-              <a:t>Slide with R Output</a:t>
-            </a:r>
-          </a:p>
-        </p:txBody>
-      </p:sp>
-      <p:sp>
-        <p:nvSpPr>
-          <p:cNvPr id="3" name="Content Placeholder 2"/>
-          <p:cNvSpPr>
-            <a:spLocks noGrp="1"/>
-          </p:cNvSpPr>
-          <p:nvPr>
-            <p:ph idx="1"/>
-          </p:nvPr>
-        </p:nvSpPr>
-        <p:spPr/>
-        <p:txBody>
-          <a:bodyPr/>
-          <a:lstStyle/>
-          <a:p>
-            <a:pPr lvl="0" indent="0">
-              <a:buNone/>
-            </a:pPr>
+              <a:rPr i="1">
+                <a:solidFill>
+                  <a:srgbClr val="60A0B0"/>
+                </a:solidFill>
+                <a:latin typeface="Courier"/>
+              </a:rPr>
+              <a:t>#this is here just for example </a:t>
+            </a:r>
+            <a:br/>
             <a:r>
               <a:rPr>
                 <a:solidFill>
@@ -3465,7 +3376,7 @@
 </p:sld>
 </file>
 
-<file path=ppt/slides/slide5.xml><?xml version="1.0" encoding="utf-8"?>
+<file path=ppt/slides/slide4.xml><?xml version="1.0" encoding="utf-8"?>
 <p:sld xmlns:a="http://schemas.openxmlformats.org/drawingml/2006/main" xmlns:r="http://schemas.openxmlformats.org/officeDocument/2006/relationships" xmlns:p="http://schemas.openxmlformats.org/presentationml/2006/main">
   <p:cSld>
     <p:spTree>
@@ -3537,6 +3448,67 @@
           </a:ln>
         </p:spPr>
       </p:pic>
+    </p:spTree>
+  </p:cSld>
+</p:sld>
+</file>
+
+<file path=ppt/slides/slide5.xml><?xml version="1.0" encoding="utf-8"?>
+<p:sld xmlns:a="http://schemas.openxmlformats.org/drawingml/2006/main" xmlns:r="http://schemas.openxmlformats.org/officeDocument/2006/relationships" xmlns:p="http://schemas.openxmlformats.org/presentationml/2006/main">
+  <p:cSld>
+    <p:spTree>
+      <p:nvGrpSpPr>
+        <p:cNvPr id="1" name=""/>
+        <p:cNvGrpSpPr/>
+        <p:nvPr/>
+      </p:nvGrpSpPr>
+      <p:grpSpPr>
+        <a:xfrm>
+          <a:off x="0" y="0"/>
+          <a:ext cx="0" cy="0"/>
+          <a:chOff x="0" y="0"/>
+          <a:chExt cx="0" cy="0"/>
+        </a:xfrm>
+      </p:grpSpPr>
+      <p:sp>
+        <p:nvSpPr>
+          <p:cNvPr id="3" name="Content Placeholder 2"/>
+          <p:cNvSpPr>
+            <a:spLocks noGrp="1"/>
+          </p:cNvSpPr>
+          <p:nvPr>
+            <p:ph idx="1"/>
+          </p:nvPr>
+        </p:nvSpPr>
+        <p:spPr/>
+        <p:txBody>
+          <a:bodyPr/>
+          <a:lstStyle/>
+          <a:p>
+            <a:pPr lvl="0" indent="0" marL="0">
+              <a:buNone/>
+            </a:pPr>
+          </a:p>
+          <a:p>
+            <a:pPr lvl="0" indent="0" marL="0">
+              <a:buNone/>
+            </a:pPr>
+            <a:r>
+              <a:rPr/>
+              <a:t>##This is new slide</a:t>
+            </a:r>
+          </a:p>
+          <a:p>
+            <a:pPr lvl="0" indent="0" marL="0">
+              <a:buNone/>
+            </a:pPr>
+            <a:r>
+              <a:rPr/>
+              <a:t>you can write anything here…</a:t>
+            </a:r>
+          </a:p>
+        </p:txBody>
+      </p:sp>
     </p:spTree>
   </p:cSld>
 </p:sld>

</xml_diff>

<commit_message>
This is Sarah, I finished point 1 in my part
</commit_message>
<xml_diff>
--- a/Progress_Presentation.pptx
+++ b/Progress_Presentation.pptx
@@ -10,6 +10,9 @@
     <p:sldId id="258" r:id="rId4"/>
     <p:sldId id="259" r:id="rId5"/>
     <p:sldId id="260" r:id="rId6"/>
+    <p:sldId id="261" r:id="rId7"/>
+    <p:sldId id="262" r:id="rId8"/>
+    <p:sldId id="263" r:id="rId9"/>
   </p:sldIdLst>
   <p:sldSz cx="9144000" cy="5143500" type="screen16x9"/>
   <p:notesSz cx="6858000" cy="9144000"/>
@@ -3119,7 +3122,7 @@
             </a:pPr>
             <a:r>
               <a:rPr/>
-              <a:t>Sleep Disorder Prediction</a:t>
+              <a:t>Sleep Disorder</a:t>
             </a:r>
           </a:p>
         </p:txBody>
@@ -3149,6 +3152,10 @@
             </a:pPr>
             <a:br/>
             <a:br/>
+            <a:r>
+              <a:rPr/>
+              <a:t>Sarah Alshumayri, Reema Abdallah, Yehya Aseeri</a:t>
+            </a:r>
           </a:p>
         </p:txBody>
       </p:sp>
@@ -3219,7 +3226,7 @@
             </a:pPr>
             <a:r>
               <a:rPr/>
-              <a:t>Slide with Bullets</a:t>
+              <a:t>Problem Statement</a:t>
             </a:r>
           </a:p>
         </p:txBody>
@@ -3239,24 +3246,21 @@
           <a:bodyPr/>
           <a:lstStyle/>
           <a:p>
-            <a:pPr lvl="0"/>
+            <a:pPr lvl="0" indent="0" marL="0">
+              <a:buNone/>
+            </a:pPr>
             <a:r>
               <a:rPr/>
-              <a:t>Bullet 1</a:t>
-            </a:r>
-          </a:p>
-          <a:p>
-            <a:pPr lvl="0"/>
+              <a:t>“Exploring the Interplay Between Sleep, Health, and Lifestyle: A Data-Driven Approach”</a:t>
+            </a:r>
+          </a:p>
+          <a:p>
+            <a:pPr lvl="0" indent="0" marL="0">
+              <a:buNone/>
+            </a:pPr>
             <a:r>
               <a:rPr/>
-              <a:t>Bullet 2</a:t>
-            </a:r>
-          </a:p>
-          <a:p>
-            <a:pPr lvl="0"/>
-            <a:r>
-              <a:rPr/>
-              <a:t>Bullet 3</a:t>
+              <a:t>This project investigates the relationship between sleep patterns (efficiency, duration, stages) and various health and lifestyle factors (physical activity, stress, caffeine/alcohol consumption, sleep disorders), aiming to uncover correlations and insights into how these elements impact an individual’s sleep quality and overall well-being.</a:t>
             </a:r>
           </a:p>
         </p:txBody>
@@ -3293,7 +3297,12 @@
             <p:ph type="title"/>
           </p:nvPr>
         </p:nvSpPr>
-        <p:spPr/>
+        <p:spPr>
+          <a:xfrm>
+            <a:off x="457201" y="204787"/>
+            <a:ext cx="3008313" cy="871538"/>
+          </a:xfrm>
+        </p:spPr>
         <p:txBody>
           <a:bodyPr/>
           <a:lstStyle/>
@@ -3303,53 +3312,53 @@
             </a:pPr>
             <a:r>
               <a:rPr/>
-              <a:t>Slide with R Output</a:t>
-            </a:r>
-          </a:p>
-        </p:txBody>
-      </p:sp>
-      <p:sp>
-        <p:nvSpPr>
-          <p:cNvPr id="3" name="Content Placeholder 2"/>
-          <p:cNvSpPr>
-            <a:spLocks noGrp="1"/>
-          </p:cNvSpPr>
-          <p:nvPr>
-            <p:ph idx="1"/>
-          </p:nvPr>
-        </p:nvSpPr>
-        <p:spPr/>
-        <p:txBody>
-          <a:bodyPr/>
-          <a:lstStyle/>
+              <a:t>Background</a:t>
+            </a:r>
+          </a:p>
+        </p:txBody>
+      </p:sp>
+      <p:sp>
+        <p:nvSpPr>
+          <p:cNvPr id="4" name="Text Placeholder 3"/>
+          <p:cNvSpPr>
+            <a:spLocks noGrp="1"/>
+          </p:cNvSpPr>
+          <p:nvPr>
+            <p:ph idx="2" sz="half" type="body"/>
+          </p:nvPr>
+        </p:nvSpPr>
+        <p:spPr/>
+        <p:txBody>
+          <a:bodyPr/>
+          <a:lstStyle/>
+          <a:p>
+            <a:pPr lvl="0" indent="0" marL="0">
+              <a:buNone/>
+            </a:pPr>
+            <a:r>
+              <a:rPr/>
+              <a:t>Sleep is a critical component of overall health and well-being, yet it is often influenced by a myriad of factors ranging from lifestyle choices to health conditions. Understanding the dynamics of sleep and its relationship with different health and lifestyle factors can provide crucial insights for improving sleep quality and, by extension, overall health and life satisfaction.</a:t>
+            </a:r>
+          </a:p>
+          <a:p>
+            <a:pPr lvl="0" indent="0" marL="0">
+              <a:buNone/>
+            </a:pPr>
+            <a:r>
+              <a:rPr/>
+              <a:t>This project leverages data-driven analysis to explore these relationships. With datasets detailing sleep efficiency, stages of sleep, and other relevant sleep metrics, combined with data on physical activity, stress levels, BMI categories, and more, we can draw a comprehensive picture of the multifaceted nature of sleep in the context of contemporary lifestyles. This analysis can potentially lead to actionable recommendations for individuals seeking to improve their sleep and overall health.</a:t>
+            </a:r>
+          </a:p>
           <a:p>
             <a:pPr lvl="0" indent="0">
               <a:buNone/>
             </a:pPr>
-            <a:r>
-              <a:rPr i="1">
-                <a:solidFill>
-                  <a:srgbClr val="60A0B0"/>
-                </a:solidFill>
-                <a:latin typeface="Courier"/>
-              </a:rPr>
-              <a:t>#this is here just for example </a:t>
-            </a:r>
-            <a:br/>
-            <a:r>
-              <a:rPr>
-                <a:solidFill>
-                  <a:srgbClr val="06287E"/>
-                </a:solidFill>
-                <a:latin typeface="Courier"/>
-              </a:rPr>
-              <a:t>summary</a:t>
-            </a:r>
             <a:r>
               <a:rPr>
                 <a:latin typeface="Courier"/>
               </a:rPr>
-              <a:t>(cars)</a:t>
+              <a:t>## 
+## Attaching package: 'dplyr'</a:t>
             </a:r>
           </a:p>
           <a:p>
@@ -3360,17 +3369,94 @@
               <a:rPr>
                 <a:latin typeface="Courier"/>
               </a:rPr>
-              <a:t>##      speed           dist       
-##  Min.   : 4.0   Min.   :  2.00  
-##  1st Qu.:12.0   1st Qu.: 26.00  
-##  Median :15.0   Median : 36.00  
-##  Mean   :15.4   Mean   : 42.98  
-##  3rd Qu.:19.0   3rd Qu.: 56.00  
-##  Max.   :25.0   Max.   :120.00</a:t>
-            </a:r>
-          </a:p>
-        </p:txBody>
-      </p:sp>
+              <a:t>## The following objects are masked from 'package:stats':
+## 
+##     filter, lag</a:t>
+            </a:r>
+          </a:p>
+          <a:p>
+            <a:pPr lvl="0" indent="0">
+              <a:buNone/>
+            </a:pPr>
+            <a:r>
+              <a:rPr>
+                <a:latin typeface="Courier"/>
+              </a:rPr>
+              <a:t>## The following objects are masked from 'package:base':
+## 
+##     intersect, setdiff, setequal, union</a:t>
+            </a:r>
+          </a:p>
+          <a:p>
+            <a:pPr lvl="0" indent="0">
+              <a:buNone/>
+            </a:pPr>
+            <a:r>
+              <a:rPr>
+                <a:latin typeface="Courier"/>
+              </a:rPr>
+              <a:t>##    Person.ID         Gender               Age         Occupation       
+##  Min.   :  1.00   Length:374         Min.   :27.00   Length:374        
+##  1st Qu.: 94.25   Class :character   1st Qu.:35.25   Class :character  
+##  Median :187.50   Mode  :character   Median :43.00   Mode  :character  
+##  Mean   :187.50                      Mean   :42.18                     
+##  3rd Qu.:280.75                      3rd Qu.:50.00                     
+##  Max.   :374.00                      Max.   :59.00                     
+##  Sleep.Duration  Quality.of.Sleep Physical.Activity.Level  Stress.Level  
+##  Min.   :5.800   Min.   :4.000    Min.   :30.00           Min.   :3.000  
+##  1st Qu.:6.400   1st Qu.:6.000    1st Qu.:45.00           1st Qu.:4.000  
+##  Median :7.200   Median :7.000    Median :60.00           Median :5.000  
+##  Mean   :7.132   Mean   :7.313    Mean   :59.17           Mean   :5.385  
+##  3rd Qu.:7.800   3rd Qu.:8.000    3rd Qu.:75.00           3rd Qu.:7.000  
+##  Max.   :8.500   Max.   :9.000    Max.   :90.00           Max.   :8.000  
+##  BMI.Category       Blood.Pressure.1 Blood.Pressure.2   Heart.Rate   
+##  Length:374         Min.   :115.0    Min.   :75.00    Min.   :65.00  
+##  Class :character   1st Qu.:125.0    1st Qu.:80.00    1st Qu.:68.00  
+##  Mode  :character   Median :130.0    Median :85.00    Median :70.00  
+##                     Mean   :128.6    Mean   :84.65    Mean   :70.17  
+##                     3rd Qu.:135.0    3rd Qu.:90.00    3rd Qu.:72.00  
+##                     Max.   :142.0    Max.   :95.00    Max.   :86.00  
+##   Daily.Steps    Sleep.Disorder       BMI.Levels   
+##  Min.   : 3000   Length:374         Min.   :1.000  
+##  1st Qu.: 5600   Class :character   1st Qu.:1.000  
+##  Median : 7000   Mode  :character   Median :1.000  
+##  Mean   : 6817                      Mean   :1.449  
+##  3rd Qu.: 8000                      3rd Qu.:2.000  
+##  Max.   :10000                      Max.   :3.000</a:t>
+            </a:r>
+          </a:p>
+        </p:txBody>
+      </p:sp>
+      <p:pic>
+        <p:nvPicPr>
+          <p:cNvPr descr="Progress_Presentation_files/figure-pptx/unnamed-chunk-1-1.png" id="0" name="Picture 1"/>
+          <p:cNvPicPr>
+            <a:picLocks noGrp="1" noChangeAspect="1"/>
+          </p:cNvPicPr>
+          <p:nvPr/>
+        </p:nvPicPr>
+        <p:blipFill>
+          <a:blip r:embed="rId2"/>
+          <a:stretch>
+            <a:fillRect/>
+          </a:stretch>
+        </p:blipFill>
+        <p:spPr bwMode="auto">
+          <a:xfrm>
+            <a:off x="3568700" y="355600"/>
+            <a:ext cx="5105400" cy="4089400"/>
+          </a:xfrm>
+          <a:prstGeom prst="rect">
+            <a:avLst/>
+          </a:prstGeom>
+          <a:noFill/>
+          <a:ln w="9525">
+            <a:noFill/>
+            <a:headEnd/>
+            <a:tailEnd/>
+          </a:ln>
+        </p:spPr>
+      </p:pic>
     </p:spTree>
   </p:cSld>
 </p:sld>
@@ -3413,41 +3499,36 @@
             </a:pPr>
             <a:r>
               <a:rPr/>
-              <a:t>Slide with Plot</a:t>
-            </a:r>
-          </a:p>
-        </p:txBody>
-      </p:sp>
-      <p:pic>
-        <p:nvPicPr>
-          <p:cNvPr descr="Progress_Presentation_files/figure-pptx/pressure-1.png" id="0" name="Picture 1"/>
-          <p:cNvPicPr>
-            <a:picLocks noGrp="1" noChangeAspect="1"/>
-          </p:cNvPicPr>
-          <p:nvPr/>
-        </p:nvPicPr>
-        <p:blipFill>
-          <a:blip r:embed="rId2"/>
-          <a:stretch>
-            <a:fillRect/>
-          </a:stretch>
-        </p:blipFill>
-        <p:spPr bwMode="auto">
-          <a:xfrm>
-            <a:off x="2451100" y="1193800"/>
-            <a:ext cx="4241800" cy="3390900"/>
-          </a:xfrm>
-          <a:prstGeom prst="rect">
-            <a:avLst/>
-          </a:prstGeom>
-          <a:noFill/>
-          <a:ln w="9525">
-            <a:noFill/>
-            <a:headEnd/>
-            <a:tailEnd/>
-          </a:ln>
-        </p:spPr>
-      </p:pic>
+              <a:t>Methods Explored</a:t>
+            </a:r>
+          </a:p>
+        </p:txBody>
+      </p:sp>
+      <p:sp>
+        <p:nvSpPr>
+          <p:cNvPr id="3" name="Content Placeholder 2"/>
+          <p:cNvSpPr>
+            <a:spLocks noGrp="1"/>
+          </p:cNvSpPr>
+          <p:nvPr>
+            <p:ph idx="1"/>
+          </p:nvPr>
+        </p:nvSpPr>
+        <p:spPr/>
+        <p:txBody>
+          <a:bodyPr/>
+          <a:lstStyle/>
+          <a:p>
+            <a:pPr lvl="0" indent="0" marL="0">
+              <a:buNone/>
+            </a:pPr>
+            <a:r>
+              <a:rPr/>
+              <a:t>Reema’s part</a:t>
+            </a:r>
+          </a:p>
+        </p:txBody>
+      </p:sp>
     </p:spTree>
   </p:cSld>
 </p:sld>
@@ -3472,6 +3553,31 @@
       </p:grpSpPr>
       <p:sp>
         <p:nvSpPr>
+          <p:cNvPr id="2" name="Title 1"/>
+          <p:cNvSpPr>
+            <a:spLocks noGrp="1"/>
+          </p:cNvSpPr>
+          <p:nvPr>
+            <p:ph type="title"/>
+          </p:nvPr>
+        </p:nvSpPr>
+        <p:spPr/>
+        <p:txBody>
+          <a:bodyPr/>
+          <a:lstStyle/>
+          <a:p>
+            <a:pPr lvl="0" indent="0" marL="0">
+              <a:buNone/>
+            </a:pPr>
+            <a:r>
+              <a:rPr/>
+              <a:t>The Methods/Tools Used</a:t>
+            </a:r>
+          </a:p>
+        </p:txBody>
+      </p:sp>
+      <p:sp>
+        <p:nvSpPr>
           <p:cNvPr id="3" name="Content Placeholder 2"/>
           <p:cNvSpPr>
             <a:spLocks noGrp="1"/>
@@ -3488,23 +3594,246 @@
             <a:pPr lvl="0" indent="0" marL="0">
               <a:buNone/>
             </a:pPr>
-          </a:p>
+            <a:r>
+              <a:rPr/>
+              <a:t>Yahya’s part</a:t>
+            </a:r>
+          </a:p>
+        </p:txBody>
+      </p:sp>
+    </p:spTree>
+  </p:cSld>
+</p:sld>
+</file>
+
+<file path=ppt/slides/slide6.xml><?xml version="1.0" encoding="utf-8"?>
+<p:sld xmlns:a="http://schemas.openxmlformats.org/drawingml/2006/main" xmlns:r="http://schemas.openxmlformats.org/officeDocument/2006/relationships" xmlns:p="http://schemas.openxmlformats.org/presentationml/2006/main">
+  <p:cSld>
+    <p:spTree>
+      <p:nvGrpSpPr>
+        <p:cNvPr id="1" name=""/>
+        <p:cNvGrpSpPr/>
+        <p:nvPr/>
+      </p:nvGrpSpPr>
+      <p:grpSpPr>
+        <a:xfrm>
+          <a:off x="0" y="0"/>
+          <a:ext cx="0" cy="0"/>
+          <a:chOff x="0" y="0"/>
+          <a:chExt cx="0" cy="0"/>
+        </a:xfrm>
+      </p:grpSpPr>
+      <p:sp>
+        <p:nvSpPr>
+          <p:cNvPr id="2" name="Title 1"/>
+          <p:cNvSpPr>
+            <a:spLocks noGrp="1"/>
+          </p:cNvSpPr>
+          <p:nvPr>
+            <p:ph type="title"/>
+          </p:nvPr>
+        </p:nvSpPr>
+        <p:spPr/>
+        <p:txBody>
+          <a:bodyPr/>
+          <a:lstStyle/>
           <a:p>
             <a:pPr lvl="0" indent="0" marL="0">
               <a:buNone/>
             </a:pPr>
             <a:r>
               <a:rPr/>
-              <a:t>##This is new slide</a:t>
-            </a:r>
-          </a:p>
+              <a:t>Results</a:t>
+            </a:r>
+          </a:p>
+        </p:txBody>
+      </p:sp>
+      <p:sp>
+        <p:nvSpPr>
+          <p:cNvPr id="3" name="Content Placeholder 2"/>
+          <p:cNvSpPr>
+            <a:spLocks noGrp="1"/>
+          </p:cNvSpPr>
+          <p:nvPr>
+            <p:ph idx="1"/>
+          </p:nvPr>
+        </p:nvSpPr>
+        <p:spPr/>
+        <p:txBody>
+          <a:bodyPr/>
+          <a:lstStyle/>
           <a:p>
             <a:pPr lvl="0" indent="0" marL="0">
               <a:buNone/>
             </a:pPr>
             <a:r>
               <a:rPr/>
-              <a:t>you can write anything here…</a:t>
+              <a:t>Sarah’s Part</a:t>
+            </a:r>
+          </a:p>
+          <a:p>
+            <a:pPr lvl="0" indent="0" marL="0">
+              <a:spcBef>
+                <a:spcPts val="3000"/>
+              </a:spcBef>
+              <a:buNone/>
+            </a:pPr>
+            <a:r>
+              <a:rPr b="1"/>
+              <a:t>Further Results:</a:t>
+            </a:r>
+          </a:p>
+          <a:p>
+            <a:pPr lvl="0" indent="0" marL="0">
+              <a:buNone/>
+            </a:pPr>
+            <a:r>
+              <a:rPr/>
+              <a:t>Sarah’s Part</a:t>
+            </a:r>
+          </a:p>
+        </p:txBody>
+      </p:sp>
+    </p:spTree>
+  </p:cSld>
+</p:sld>
+</file>
+
+<file path=ppt/slides/slide7.xml><?xml version="1.0" encoding="utf-8"?>
+<p:sld xmlns:a="http://schemas.openxmlformats.org/drawingml/2006/main" xmlns:r="http://schemas.openxmlformats.org/officeDocument/2006/relationships" xmlns:p="http://schemas.openxmlformats.org/presentationml/2006/main">
+  <p:cSld>
+    <p:spTree>
+      <p:nvGrpSpPr>
+        <p:cNvPr id="1" name=""/>
+        <p:cNvGrpSpPr/>
+        <p:nvPr/>
+      </p:nvGrpSpPr>
+      <p:grpSpPr>
+        <a:xfrm>
+          <a:off x="0" y="0"/>
+          <a:ext cx="0" cy="0"/>
+          <a:chOff x="0" y="0"/>
+          <a:chExt cx="0" cy="0"/>
+        </a:xfrm>
+      </p:grpSpPr>
+      <p:sp>
+        <p:nvSpPr>
+          <p:cNvPr id="2" name="Title 1"/>
+          <p:cNvSpPr>
+            <a:spLocks noGrp="1"/>
+          </p:cNvSpPr>
+          <p:nvPr>
+            <p:ph type="title"/>
+          </p:nvPr>
+        </p:nvSpPr>
+        <p:spPr/>
+        <p:txBody>
+          <a:bodyPr/>
+          <a:lstStyle/>
+          <a:p>
+            <a:pPr lvl="0" indent="0" marL="0">
+              <a:buNone/>
+            </a:pPr>
+            <a:r>
+              <a:rPr/>
+              <a:t>Lessons Learned</a:t>
+            </a:r>
+          </a:p>
+        </p:txBody>
+      </p:sp>
+      <p:sp>
+        <p:nvSpPr>
+          <p:cNvPr id="3" name="Content Placeholder 2"/>
+          <p:cNvSpPr>
+            <a:spLocks noGrp="1"/>
+          </p:cNvSpPr>
+          <p:nvPr>
+            <p:ph idx="1"/>
+          </p:nvPr>
+        </p:nvSpPr>
+        <p:spPr/>
+        <p:txBody>
+          <a:bodyPr/>
+          <a:lstStyle/>
+          <a:p>
+            <a:pPr lvl="0" indent="0" marL="0">
+              <a:buNone/>
+            </a:pPr>
+            <a:r>
+              <a:rPr/>
+              <a:t>Reema’s part</a:t>
+            </a:r>
+          </a:p>
+        </p:txBody>
+      </p:sp>
+    </p:spTree>
+  </p:cSld>
+</p:sld>
+</file>
+
+<file path=ppt/slides/slide8.xml><?xml version="1.0" encoding="utf-8"?>
+<p:sld xmlns:a="http://schemas.openxmlformats.org/drawingml/2006/main" xmlns:r="http://schemas.openxmlformats.org/officeDocument/2006/relationships" xmlns:p="http://schemas.openxmlformats.org/presentationml/2006/main">
+  <p:cSld>
+    <p:spTree>
+      <p:nvGrpSpPr>
+        <p:cNvPr id="1" name=""/>
+        <p:cNvGrpSpPr/>
+        <p:nvPr/>
+      </p:nvGrpSpPr>
+      <p:grpSpPr>
+        <a:xfrm>
+          <a:off x="0" y="0"/>
+          <a:ext cx="0" cy="0"/>
+          <a:chOff x="0" y="0"/>
+          <a:chExt cx="0" cy="0"/>
+        </a:xfrm>
+      </p:grpSpPr>
+      <p:sp>
+        <p:nvSpPr>
+          <p:cNvPr id="2" name="Title 1"/>
+          <p:cNvSpPr>
+            <a:spLocks noGrp="1"/>
+          </p:cNvSpPr>
+          <p:nvPr>
+            <p:ph type="title"/>
+          </p:nvPr>
+        </p:nvSpPr>
+        <p:spPr/>
+        <p:txBody>
+          <a:bodyPr/>
+          <a:lstStyle/>
+          <a:p>
+            <a:pPr lvl="0" indent="0" marL="0">
+              <a:buNone/>
+            </a:pPr>
+            <a:r>
+              <a:rPr/>
+              <a:t>Future Plans</a:t>
+            </a:r>
+          </a:p>
+        </p:txBody>
+      </p:sp>
+      <p:sp>
+        <p:nvSpPr>
+          <p:cNvPr id="3" name="Content Placeholder 2"/>
+          <p:cNvSpPr>
+            <a:spLocks noGrp="1"/>
+          </p:cNvSpPr>
+          <p:nvPr>
+            <p:ph idx="1"/>
+          </p:nvPr>
+        </p:nvSpPr>
+        <p:spPr/>
+        <p:txBody>
+          <a:bodyPr/>
+          <a:lstStyle/>
+          <a:p>
+            <a:pPr lvl="0" indent="0" marL="0">
+              <a:buNone/>
+            </a:pPr>
+            <a:r>
+              <a:rPr/>
+              <a:t>Reema’s part</a:t>
             </a:r>
           </a:p>
         </p:txBody>

</xml_diff>

<commit_message>
This is Sarah, I finished my part
</commit_message>
<xml_diff>
--- a/Progress_Presentation.pptx
+++ b/Progress_Presentation.pptx
@@ -1,6 +1,6 @@
 
 <file path=ppt/presentation.xml><?xml version="1.0" encoding="utf-8"?>
-<p:presentation xmlns:a="http://schemas.openxmlformats.org/drawingml/2006/main" xmlns:p="http://schemas.openxmlformats.org/presentationml/2006/main" xmlns:r="http://schemas.openxmlformats.org/officeDocument/2006/relationships" autoCompressPictures="0" saveSubsetFonts="1">
+<p:presentation xmlns:a="http://schemas.openxmlformats.org/drawingml/2006/main" xmlns:r="http://schemas.openxmlformats.org/officeDocument/2006/relationships" xmlns:p="http://schemas.openxmlformats.org/presentationml/2006/main" saveSubsetFonts="1" autoCompressPictures="0">
   <p:sldMasterIdLst>
     <p:sldMasterId id="2147483648" r:id="rId1"/>
   </p:sldMasterIdLst>
@@ -11,8 +11,9 @@
     <p:sldId id="259" r:id="rId5"/>
     <p:sldId id="260" r:id="rId6"/>
     <p:sldId id="261" r:id="rId7"/>
-    <p:sldId id="262" r:id="rId8"/>
-    <p:sldId id="263" r:id="rId9"/>
+    <p:sldId id="264" r:id="rId8"/>
+    <p:sldId id="262" r:id="rId9"/>
+    <p:sldId id="263" r:id="rId10"/>
   </p:sldIdLst>
   <p:sldSz cx="9144000" cy="5143500" type="screen16x9"/>
   <p:notesSz cx="6858000" cy="9144000"/>
@@ -20,8 +21,8 @@
     <a:defPPr>
       <a:defRPr lang="en-US"/>
     </a:defPPr>
-    <a:lvl1pPr algn="l" defTabSz="457200" eaLnBrk="1" hangingPunct="1" latinLnBrk="0" marL="0" rtl="0">
-      <a:defRPr kern="1200" sz="1800">
+    <a:lvl1pPr marL="0" algn="l" defTabSz="457200" rtl="0" eaLnBrk="1" latinLnBrk="0" hangingPunct="1">
+      <a:defRPr sz="1800" kern="1200">
         <a:solidFill>
           <a:schemeClr val="tx1"/>
         </a:solidFill>
@@ -30,8 +31,8 @@
         <a:cs typeface="+mn-cs"/>
       </a:defRPr>
     </a:lvl1pPr>
-    <a:lvl2pPr algn="l" defTabSz="457200" eaLnBrk="1" hangingPunct="1" latinLnBrk="0" marL="457200" rtl="0">
-      <a:defRPr kern="1200" sz="1800">
+    <a:lvl2pPr marL="457200" algn="l" defTabSz="457200" rtl="0" eaLnBrk="1" latinLnBrk="0" hangingPunct="1">
+      <a:defRPr sz="1800" kern="1200">
         <a:solidFill>
           <a:schemeClr val="tx1"/>
         </a:solidFill>
@@ -40,8 +41,8 @@
         <a:cs typeface="+mn-cs"/>
       </a:defRPr>
     </a:lvl2pPr>
-    <a:lvl3pPr algn="l" defTabSz="457200" eaLnBrk="1" hangingPunct="1" latinLnBrk="0" marL="914400" rtl="0">
-      <a:defRPr kern="1200" sz="1800">
+    <a:lvl3pPr marL="914400" algn="l" defTabSz="457200" rtl="0" eaLnBrk="1" latinLnBrk="0" hangingPunct="1">
+      <a:defRPr sz="1800" kern="1200">
         <a:solidFill>
           <a:schemeClr val="tx1"/>
         </a:solidFill>
@@ -50,8 +51,8 @@
         <a:cs typeface="+mn-cs"/>
       </a:defRPr>
     </a:lvl3pPr>
-    <a:lvl4pPr algn="l" defTabSz="457200" eaLnBrk="1" hangingPunct="1" latinLnBrk="0" marL="1371600" rtl="0">
-      <a:defRPr kern="1200" sz="1800">
+    <a:lvl4pPr marL="1371600" algn="l" defTabSz="457200" rtl="0" eaLnBrk="1" latinLnBrk="0" hangingPunct="1">
+      <a:defRPr sz="1800" kern="1200">
         <a:solidFill>
           <a:schemeClr val="tx1"/>
         </a:solidFill>
@@ -60,8 +61,8 @@
         <a:cs typeface="+mn-cs"/>
       </a:defRPr>
     </a:lvl4pPr>
-    <a:lvl5pPr algn="l" defTabSz="457200" eaLnBrk="1" hangingPunct="1" latinLnBrk="0" marL="1828800" rtl="0">
-      <a:defRPr kern="1200" sz="1800">
+    <a:lvl5pPr marL="1828800" algn="l" defTabSz="457200" rtl="0" eaLnBrk="1" latinLnBrk="0" hangingPunct="1">
+      <a:defRPr sz="1800" kern="1200">
         <a:solidFill>
           <a:schemeClr val="tx1"/>
         </a:solidFill>
@@ -70,8 +71,8 @@
         <a:cs typeface="+mn-cs"/>
       </a:defRPr>
     </a:lvl5pPr>
-    <a:lvl6pPr algn="l" defTabSz="457200" eaLnBrk="1" hangingPunct="1" latinLnBrk="0" marL="2286000" rtl="0">
-      <a:defRPr kern="1200" sz="1800">
+    <a:lvl6pPr marL="2286000" algn="l" defTabSz="457200" rtl="0" eaLnBrk="1" latinLnBrk="0" hangingPunct="1">
+      <a:defRPr sz="1800" kern="1200">
         <a:solidFill>
           <a:schemeClr val="tx1"/>
         </a:solidFill>
@@ -80,8 +81,8 @@
         <a:cs typeface="+mn-cs"/>
       </a:defRPr>
     </a:lvl6pPr>
-    <a:lvl7pPr algn="l" defTabSz="457200" eaLnBrk="1" hangingPunct="1" latinLnBrk="0" marL="2743200" rtl="0">
-      <a:defRPr kern="1200" sz="1800">
+    <a:lvl7pPr marL="2743200" algn="l" defTabSz="457200" rtl="0" eaLnBrk="1" latinLnBrk="0" hangingPunct="1">
+      <a:defRPr sz="1800" kern="1200">
         <a:solidFill>
           <a:schemeClr val="tx1"/>
         </a:solidFill>
@@ -90,8 +91,8 @@
         <a:cs typeface="+mn-cs"/>
       </a:defRPr>
     </a:lvl7pPr>
-    <a:lvl8pPr algn="l" defTabSz="457200" eaLnBrk="1" hangingPunct="1" latinLnBrk="0" marL="3200400" rtl="0">
-      <a:defRPr kern="1200" sz="1800">
+    <a:lvl8pPr marL="3200400" algn="l" defTabSz="457200" rtl="0" eaLnBrk="1" latinLnBrk="0" hangingPunct="1">
+      <a:defRPr sz="1800" kern="1200">
         <a:solidFill>
           <a:schemeClr val="tx1"/>
         </a:solidFill>
@@ -100,8 +101,8 @@
         <a:cs typeface="+mn-cs"/>
       </a:defRPr>
     </a:lvl8pPr>
-    <a:lvl9pPr algn="l" defTabSz="457200" eaLnBrk="1" hangingPunct="1" latinLnBrk="0" marL="3657600" rtl="0">
-      <a:defRPr kern="1200" sz="1800">
+    <a:lvl9pPr marL="3657600" algn="l" defTabSz="457200" rtl="0" eaLnBrk="1" latinLnBrk="0" hangingPunct="1">
+      <a:defRPr sz="1800" kern="1200">
         <a:solidFill>
           <a:schemeClr val="tx1"/>
         </a:solidFill>
@@ -309,7 +310,7 @@
           <a:p>
             <a:fld id="{241EB5C9-1307-BA42-ABA2-0BC069CD8E7F}" type="datetimeFigureOut">
               <a:rPr lang="en-US" smtClean="0"/>
-              <a:t>1/2/22</a:t>
+              <a:t>11/24/2023</a:t>
             </a:fld>
             <a:endParaRPr lang="en-US"/>
           </a:p>
@@ -477,7 +478,7 @@
           <a:p>
             <a:fld id="{241EB5C9-1307-BA42-ABA2-0BC069CD8E7F}" type="datetimeFigureOut">
               <a:rPr lang="en-US" smtClean="0"/>
-              <a:t>1/2/22</a:t>
+              <a:t>11/24/2023</a:t>
             </a:fld>
             <a:endParaRPr lang="en-US"/>
           </a:p>
@@ -655,7 +656,7 @@
           <a:p>
             <a:fld id="{241EB5C9-1307-BA42-ABA2-0BC069CD8E7F}" type="datetimeFigureOut">
               <a:rPr lang="en-US" smtClean="0"/>
-              <a:t>1/2/22</a:t>
+              <a:t>11/24/2023</a:t>
             </a:fld>
             <a:endParaRPr lang="en-US"/>
           </a:p>
@@ -823,7 +824,7 @@
           <a:p>
             <a:fld id="{241EB5C9-1307-BA42-ABA2-0BC069CD8E7F}" type="datetimeFigureOut">
               <a:rPr lang="en-US" smtClean="0"/>
-              <a:t>1/2/22</a:t>
+              <a:t>11/24/2023</a:t>
             </a:fld>
             <a:endParaRPr lang="en-US"/>
           </a:p>
@@ -1068,7 +1069,7 @@
           <a:p>
             <a:fld id="{241EB5C9-1307-BA42-ABA2-0BC069CD8E7F}" type="datetimeFigureOut">
               <a:rPr lang="en-US" smtClean="0"/>
-              <a:t>1/2/22</a:t>
+              <a:t>11/24/2023</a:t>
             </a:fld>
             <a:endParaRPr lang="en-US"/>
           </a:p>
@@ -1353,7 +1354,7 @@
           <a:p>
             <a:fld id="{241EB5C9-1307-BA42-ABA2-0BC069CD8E7F}" type="datetimeFigureOut">
               <a:rPr lang="en-US" smtClean="0"/>
-              <a:t>1/2/22</a:t>
+              <a:t>11/24/2023</a:t>
             </a:fld>
             <a:endParaRPr lang="en-US"/>
           </a:p>
@@ -1772,7 +1773,7 @@
           <a:p>
             <a:fld id="{241EB5C9-1307-BA42-ABA2-0BC069CD8E7F}" type="datetimeFigureOut">
               <a:rPr lang="en-US" smtClean="0"/>
-              <a:t>1/2/22</a:t>
+              <a:t>11/24/2023</a:t>
             </a:fld>
             <a:endParaRPr lang="en-US"/>
           </a:p>
@@ -1889,7 +1890,7 @@
           <a:p>
             <a:fld id="{241EB5C9-1307-BA42-ABA2-0BC069CD8E7F}" type="datetimeFigureOut">
               <a:rPr lang="en-US" smtClean="0"/>
-              <a:t>1/2/22</a:t>
+              <a:t>11/24/2023</a:t>
             </a:fld>
             <a:endParaRPr lang="en-US"/>
           </a:p>
@@ -1984,7 +1985,7 @@
           <a:p>
             <a:fld id="{241EB5C9-1307-BA42-ABA2-0BC069CD8E7F}" type="datetimeFigureOut">
               <a:rPr lang="en-US" smtClean="0"/>
-              <a:t>1/2/22</a:t>
+              <a:t>11/24/2023</a:t>
             </a:fld>
             <a:endParaRPr lang="en-US"/>
           </a:p>
@@ -2259,7 +2260,7 @@
           <a:p>
             <a:fld id="{241EB5C9-1307-BA42-ABA2-0BC069CD8E7F}" type="datetimeFigureOut">
               <a:rPr lang="en-US" smtClean="0"/>
-              <a:t>1/2/22</a:t>
+              <a:t>11/24/2023</a:t>
             </a:fld>
             <a:endParaRPr lang="en-US"/>
           </a:p>
@@ -2511,7 +2512,7 @@
           <a:p>
             <a:fld id="{241EB5C9-1307-BA42-ABA2-0BC069CD8E7F}" type="datetimeFigureOut">
               <a:rPr lang="en-US" smtClean="0"/>
-              <a:t>1/2/22</a:t>
+              <a:t>11/24/2023</a:t>
             </a:fld>
             <a:endParaRPr lang="en-US"/>
           </a:p>
@@ -2573,7 +2574,7 @@
 </file>
 
 <file path=ppt/slideMasters/slideMaster1.xml><?xml version="1.0" encoding="utf-8"?>
-<p:sldMaster xmlns:a="http://schemas.openxmlformats.org/drawingml/2006/main" xmlns:p="http://schemas.openxmlformats.org/presentationml/2006/main" xmlns:r="http://schemas.openxmlformats.org/officeDocument/2006/relationships">
+<p:sldMaster xmlns:a="http://schemas.openxmlformats.org/drawingml/2006/main" xmlns:r="http://schemas.openxmlformats.org/officeDocument/2006/relationships" xmlns:p="http://schemas.openxmlformats.org/presentationml/2006/main">
   <p:cSld>
     <p:bg>
       <p:bgRef idx="1001">
@@ -2614,7 +2615,7 @@
           </a:prstGeom>
         </p:spPr>
         <p:txBody>
-          <a:bodyPr anchor="ctr" bIns="45720" lIns="91440" rIns="91440" rtlCol="0" tIns="45720" vert="horz">
+          <a:bodyPr vert="horz" lIns="91440" tIns="45720" rIns="91440" bIns="45720" rtlCol="0" anchor="ctr">
             <a:normAutofit/>
           </a:bodyPr>
           <a:lstStyle/>
@@ -2633,7 +2634,7 @@
             <a:spLocks noGrp="1"/>
           </p:cNvSpPr>
           <p:nvPr>
-            <p:ph idx="1" type="body"/>
+            <p:ph type="body" idx="1"/>
           </p:nvPr>
         </p:nvSpPr>
         <p:spPr>
@@ -2646,7 +2647,7 @@
           </a:prstGeom>
         </p:spPr>
         <p:txBody>
-          <a:bodyPr bIns="45720" lIns="91440" rIns="91440" rtlCol="0" tIns="45720" vert="horz">
+          <a:bodyPr vert="horz" lIns="91440" tIns="45720" rIns="91440" bIns="45720" rtlCol="0">
             <a:normAutofit/>
           </a:bodyPr>
           <a:lstStyle/>
@@ -2694,7 +2695,7 @@
             <a:spLocks noGrp="1"/>
           </p:cNvSpPr>
           <p:nvPr>
-            <p:ph idx="2" sz="half" type="dt"/>
+            <p:ph type="dt" sz="half" idx="2"/>
           </p:nvPr>
         </p:nvSpPr>
         <p:spPr>
@@ -2707,7 +2708,7 @@
           </a:prstGeom>
         </p:spPr>
         <p:txBody>
-          <a:bodyPr anchor="ctr" bIns="45720" lIns="91440" rIns="91440" rtlCol="0" tIns="45720" vert="horz"/>
+          <a:bodyPr vert="horz" lIns="91440" tIns="45720" rIns="91440" bIns="45720" rtlCol="0" anchor="ctr"/>
           <a:lstStyle>
             <a:lvl1pPr algn="l">
               <a:defRPr sz="900">
@@ -2722,7 +2723,7 @@
           <a:p>
             <a:fld id="{241EB5C9-1307-BA42-ABA2-0BC069CD8E7F}" type="datetimeFigureOut">
               <a:rPr lang="en-US" smtClean="0"/>
-              <a:t>1/2/22</a:t>
+              <a:t>11/24/2023</a:t>
             </a:fld>
             <a:endParaRPr lang="en-US"/>
           </a:p>
@@ -2735,7 +2736,7 @@
             <a:spLocks noGrp="1"/>
           </p:cNvSpPr>
           <p:nvPr>
-            <p:ph idx="3" sz="quarter" type="ftr"/>
+            <p:ph type="ftr" sz="quarter" idx="3"/>
           </p:nvPr>
         </p:nvSpPr>
         <p:spPr>
@@ -2748,7 +2749,7 @@
           </a:prstGeom>
         </p:spPr>
         <p:txBody>
-          <a:bodyPr anchor="ctr" bIns="45720" lIns="91440" rIns="91440" rtlCol="0" tIns="45720" vert="horz"/>
+          <a:bodyPr vert="horz" lIns="91440" tIns="45720" rIns="91440" bIns="45720" rtlCol="0" anchor="ctr"/>
           <a:lstStyle>
             <a:lvl1pPr algn="ctr">
               <a:defRPr sz="900">
@@ -2772,7 +2773,7 @@
             <a:spLocks noGrp="1"/>
           </p:cNvSpPr>
           <p:nvPr>
-            <p:ph idx="4" sz="quarter" type="sldNum"/>
+            <p:ph type="sldNum" sz="quarter" idx="4"/>
           </p:nvPr>
         </p:nvSpPr>
         <p:spPr>
@@ -2785,7 +2786,7 @@
           </a:prstGeom>
         </p:spPr>
         <p:txBody>
-          <a:bodyPr anchor="ctr" bIns="45720" lIns="91440" rIns="91440" rtlCol="0" tIns="45720" vert="horz"/>
+          <a:bodyPr vert="horz" lIns="91440" tIns="45720" rIns="91440" bIns="45720" rtlCol="0" anchor="ctr"/>
           <a:lstStyle>
             <a:lvl1pPr algn="r">
               <a:defRPr sz="900">
@@ -2813,7 +2814,7 @@
       </p:ext>
     </p:extLst>
   </p:cSld>
-  <p:clrMap accent1="accent1" accent2="accent2" accent3="accent3" accent4="accent4" accent5="accent5" accent6="accent6" bg1="lt1" bg2="lt2" folHlink="folHlink" hlink="hlink" tx1="dk1" tx2="dk2"/>
+  <p:clrMap bg1="lt1" tx1="dk1" bg2="lt2" tx2="dk2" accent1="accent1" accent2="accent2" accent3="accent3" accent4="accent4" accent5="accent5" accent6="accent6" hlink="hlink" folHlink="folHlink"/>
   <p:sldLayoutIdLst>
     <p:sldLayoutId id="2147483649" r:id="rId1"/>
     <p:sldLayoutId id="2147483650" r:id="rId2"/>
@@ -2829,12 +2830,12 @@
   </p:sldLayoutIdLst>
   <p:txStyles>
     <p:titleStyle>
-      <a:lvl1pPr algn="ctr" defTabSz="342900" eaLnBrk="1" hangingPunct="1" latinLnBrk="0" rtl="0">
+      <a:lvl1pPr algn="ctr" defTabSz="342900" rtl="0" eaLnBrk="1" latinLnBrk="0" hangingPunct="1">
         <a:spcBef>
           <a:spcPct val="0"/>
         </a:spcBef>
         <a:buNone/>
-        <a:defRPr kern="1200" sz="3300">
+        <a:defRPr sz="3300" kern="1200">
           <a:solidFill>
             <a:schemeClr val="tx1"/>
           </a:solidFill>
@@ -2845,13 +2846,13 @@
       </a:lvl1pPr>
     </p:titleStyle>
     <p:bodyStyle>
-      <a:lvl1pPr algn="l" defTabSz="342900" eaLnBrk="1" hangingPunct="1" indent="-342900" latinLnBrk="0" marL="342900" rtl="0">
+      <a:lvl1pPr marL="342900" indent="-342900" algn="l" defTabSz="342900" rtl="0" eaLnBrk="1" latinLnBrk="0" hangingPunct="1">
         <a:spcBef>
           <a:spcPct val="20000"/>
         </a:spcBef>
         <a:buFont typeface="Arial"/>
         <a:buChar char="•"/>
-        <a:defRPr kern="1200" sz="2400">
+        <a:defRPr sz="2400" kern="1200">
           <a:solidFill>
             <a:schemeClr val="tx1"/>
           </a:solidFill>
@@ -2860,13 +2861,13 @@
           <a:cs typeface="+mn-cs"/>
         </a:defRPr>
       </a:lvl1pPr>
-      <a:lvl2pPr algn="l" defTabSz="342900" eaLnBrk="1" hangingPunct="1" indent="-342900" latinLnBrk="0" marL="685800" rtl="0">
+      <a:lvl2pPr marL="685800" indent="-342900" algn="l" defTabSz="342900" rtl="0" eaLnBrk="1" latinLnBrk="0" hangingPunct="1">
         <a:spcBef>
           <a:spcPct val="20000"/>
         </a:spcBef>
         <a:buFont typeface="Arial"/>
         <a:buChar char="–"/>
-        <a:defRPr kern="1200" sz="2100">
+        <a:defRPr sz="2100" kern="1200">
           <a:solidFill>
             <a:schemeClr val="tx1"/>
           </a:solidFill>
@@ -2875,13 +2876,13 @@
           <a:cs typeface="+mn-cs"/>
         </a:defRPr>
       </a:lvl2pPr>
-      <a:lvl3pPr algn="l" defTabSz="342900" eaLnBrk="1" hangingPunct="1" indent="-342900" latinLnBrk="0" marL="1028700" rtl="0">
+      <a:lvl3pPr marL="1028700" indent="-342900" algn="l" defTabSz="342900" rtl="0" eaLnBrk="1" latinLnBrk="0" hangingPunct="1">
         <a:spcBef>
           <a:spcPct val="20000"/>
         </a:spcBef>
         <a:buFont typeface="Arial"/>
         <a:buChar char="•"/>
-        <a:defRPr kern="1200" sz="1800">
+        <a:defRPr sz="1800" kern="1200">
           <a:solidFill>
             <a:schemeClr val="tx1"/>
           </a:solidFill>
@@ -2890,13 +2891,13 @@
           <a:cs typeface="+mn-cs"/>
         </a:defRPr>
       </a:lvl3pPr>
-      <a:lvl4pPr algn="l" defTabSz="342900" eaLnBrk="1" hangingPunct="1" indent="-342900" latinLnBrk="0" marL="1371600" rtl="0">
+      <a:lvl4pPr marL="1371600" indent="-342900" algn="l" defTabSz="342900" rtl="0" eaLnBrk="1" latinLnBrk="0" hangingPunct="1">
         <a:spcBef>
           <a:spcPct val="20000"/>
         </a:spcBef>
         <a:buFont typeface="Arial"/>
         <a:buChar char="–"/>
-        <a:defRPr kern="1200" sz="1500">
+        <a:defRPr sz="1500" kern="1200">
           <a:solidFill>
             <a:schemeClr val="tx1"/>
           </a:solidFill>
@@ -2905,13 +2906,13 @@
           <a:cs typeface="+mn-cs"/>
         </a:defRPr>
       </a:lvl4pPr>
-      <a:lvl5pPr algn="l" defTabSz="342900" eaLnBrk="1" hangingPunct="1" indent="-342900" latinLnBrk="0" marL="1714500" rtl="0">
+      <a:lvl5pPr marL="1714500" indent="-342900" algn="l" defTabSz="342900" rtl="0" eaLnBrk="1" latinLnBrk="0" hangingPunct="1">
         <a:spcBef>
           <a:spcPct val="20000"/>
         </a:spcBef>
         <a:buFont typeface="Arial"/>
         <a:buChar char="»"/>
-        <a:defRPr kern="1200" sz="1500">
+        <a:defRPr sz="1500" kern="1200">
           <a:solidFill>
             <a:schemeClr val="tx1"/>
           </a:solidFill>
@@ -2920,13 +2921,13 @@
           <a:cs typeface="+mn-cs"/>
         </a:defRPr>
       </a:lvl5pPr>
-      <a:lvl6pPr algn="l" defTabSz="342900" eaLnBrk="1" hangingPunct="1" indent="-342900" latinLnBrk="0" marL="2057400" rtl="0">
+      <a:lvl6pPr marL="2057400" indent="-342900" algn="l" defTabSz="342900" rtl="0" eaLnBrk="1" latinLnBrk="0" hangingPunct="1">
         <a:spcBef>
           <a:spcPct val="20000"/>
         </a:spcBef>
         <a:buFont typeface="Arial"/>
         <a:buChar char="•"/>
-        <a:defRPr kern="1200" sz="1500">
+        <a:defRPr sz="1500" kern="1200">
           <a:solidFill>
             <a:schemeClr val="tx1"/>
           </a:solidFill>
@@ -2935,13 +2936,13 @@
           <a:cs typeface="+mn-cs"/>
         </a:defRPr>
       </a:lvl6pPr>
-      <a:lvl7pPr algn="l" defTabSz="342900" eaLnBrk="1" hangingPunct="1" indent="-342900" latinLnBrk="0" marL="2400300" rtl="0">
+      <a:lvl7pPr marL="2400300" indent="-342900" algn="l" defTabSz="342900" rtl="0" eaLnBrk="1" latinLnBrk="0" hangingPunct="1">
         <a:spcBef>
           <a:spcPct val="20000"/>
         </a:spcBef>
         <a:buFont typeface="Arial"/>
         <a:buChar char="•"/>
-        <a:defRPr kern="1200" sz="1500">
+        <a:defRPr sz="1500" kern="1200">
           <a:solidFill>
             <a:schemeClr val="tx1"/>
           </a:solidFill>
@@ -2950,13 +2951,13 @@
           <a:cs typeface="+mn-cs"/>
         </a:defRPr>
       </a:lvl7pPr>
-      <a:lvl8pPr algn="l" defTabSz="342900" eaLnBrk="1" hangingPunct="1" indent="-342900" latinLnBrk="0" marL="2743200" rtl="0">
+      <a:lvl8pPr marL="2743200" indent="-342900" algn="l" defTabSz="342900" rtl="0" eaLnBrk="1" latinLnBrk="0" hangingPunct="1">
         <a:spcBef>
           <a:spcPct val="20000"/>
         </a:spcBef>
         <a:buFont typeface="Arial"/>
         <a:buChar char="•"/>
-        <a:defRPr kern="1200" sz="1500">
+        <a:defRPr sz="1500" kern="1200">
           <a:solidFill>
             <a:schemeClr val="tx1"/>
           </a:solidFill>
@@ -2965,13 +2966,13 @@
           <a:cs typeface="+mn-cs"/>
         </a:defRPr>
       </a:lvl8pPr>
-      <a:lvl9pPr algn="l" defTabSz="342900" eaLnBrk="1" hangingPunct="1" indent="-342900" latinLnBrk="0" marL="3086100" rtl="0">
+      <a:lvl9pPr marL="3086100" indent="-342900" algn="l" defTabSz="342900" rtl="0" eaLnBrk="1" latinLnBrk="0" hangingPunct="1">
         <a:spcBef>
           <a:spcPct val="20000"/>
         </a:spcBef>
         <a:buFont typeface="Arial"/>
         <a:buChar char="•"/>
-        <a:defRPr kern="1200" sz="1500">
+        <a:defRPr sz="1500" kern="1200">
           <a:solidFill>
             <a:schemeClr val="tx1"/>
           </a:solidFill>
@@ -2985,8 +2986,8 @@
       <a:defPPr>
         <a:defRPr lang="en-US"/>
       </a:defPPr>
-      <a:lvl1pPr algn="l" defTabSz="342900" eaLnBrk="1" hangingPunct="1" latinLnBrk="0" marL="0" rtl="0">
-        <a:defRPr kern="1200" sz="1350">
+      <a:lvl1pPr marL="0" algn="l" defTabSz="342900" rtl="0" eaLnBrk="1" latinLnBrk="0" hangingPunct="1">
+        <a:defRPr sz="1350" kern="1200">
           <a:solidFill>
             <a:schemeClr val="tx1"/>
           </a:solidFill>
@@ -2995,8 +2996,8 @@
           <a:cs typeface="+mn-cs"/>
         </a:defRPr>
       </a:lvl1pPr>
-      <a:lvl2pPr algn="l" defTabSz="342900" eaLnBrk="1" hangingPunct="1" latinLnBrk="0" marL="342900" rtl="0">
-        <a:defRPr kern="1200" sz="1350">
+      <a:lvl2pPr marL="342900" algn="l" defTabSz="342900" rtl="0" eaLnBrk="1" latinLnBrk="0" hangingPunct="1">
+        <a:defRPr sz="1350" kern="1200">
           <a:solidFill>
             <a:schemeClr val="tx1"/>
           </a:solidFill>
@@ -3005,8 +3006,8 @@
           <a:cs typeface="+mn-cs"/>
         </a:defRPr>
       </a:lvl2pPr>
-      <a:lvl3pPr algn="l" defTabSz="342900" eaLnBrk="1" hangingPunct="1" latinLnBrk="0" marL="685800" rtl="0">
-        <a:defRPr kern="1200" sz="1350">
+      <a:lvl3pPr marL="685800" algn="l" defTabSz="342900" rtl="0" eaLnBrk="1" latinLnBrk="0" hangingPunct="1">
+        <a:defRPr sz="1350" kern="1200">
           <a:solidFill>
             <a:schemeClr val="tx1"/>
           </a:solidFill>
@@ -3015,8 +3016,8 @@
           <a:cs typeface="+mn-cs"/>
         </a:defRPr>
       </a:lvl3pPr>
-      <a:lvl4pPr algn="l" defTabSz="342900" eaLnBrk="1" hangingPunct="1" latinLnBrk="0" marL="1028700" rtl="0">
-        <a:defRPr kern="1200" sz="1350">
+      <a:lvl4pPr marL="1028700" algn="l" defTabSz="342900" rtl="0" eaLnBrk="1" latinLnBrk="0" hangingPunct="1">
+        <a:defRPr sz="1350" kern="1200">
           <a:solidFill>
             <a:schemeClr val="tx1"/>
           </a:solidFill>
@@ -3025,8 +3026,8 @@
           <a:cs typeface="+mn-cs"/>
         </a:defRPr>
       </a:lvl4pPr>
-      <a:lvl5pPr algn="l" defTabSz="342900" eaLnBrk="1" hangingPunct="1" latinLnBrk="0" marL="1371600" rtl="0">
-        <a:defRPr kern="1200" sz="1350">
+      <a:lvl5pPr marL="1371600" algn="l" defTabSz="342900" rtl="0" eaLnBrk="1" latinLnBrk="0" hangingPunct="1">
+        <a:defRPr sz="1350" kern="1200">
           <a:solidFill>
             <a:schemeClr val="tx1"/>
           </a:solidFill>
@@ -3035,8 +3036,8 @@
           <a:cs typeface="+mn-cs"/>
         </a:defRPr>
       </a:lvl5pPr>
-      <a:lvl6pPr algn="l" defTabSz="342900" eaLnBrk="1" hangingPunct="1" latinLnBrk="0" marL="1714500" rtl="0">
-        <a:defRPr kern="1200" sz="1350">
+      <a:lvl6pPr marL="1714500" algn="l" defTabSz="342900" rtl="0" eaLnBrk="1" latinLnBrk="0" hangingPunct="1">
+        <a:defRPr sz="1350" kern="1200">
           <a:solidFill>
             <a:schemeClr val="tx1"/>
           </a:solidFill>
@@ -3045,8 +3046,8 @@
           <a:cs typeface="+mn-cs"/>
         </a:defRPr>
       </a:lvl6pPr>
-      <a:lvl7pPr algn="l" defTabSz="342900" eaLnBrk="1" hangingPunct="1" latinLnBrk="0" marL="2057400" rtl="0">
-        <a:defRPr kern="1200" sz="1350">
+      <a:lvl7pPr marL="2057400" algn="l" defTabSz="342900" rtl="0" eaLnBrk="1" latinLnBrk="0" hangingPunct="1">
+        <a:defRPr sz="1350" kern="1200">
           <a:solidFill>
             <a:schemeClr val="tx1"/>
           </a:solidFill>
@@ -3055,8 +3056,8 @@
           <a:cs typeface="+mn-cs"/>
         </a:defRPr>
       </a:lvl7pPr>
-      <a:lvl8pPr algn="l" defTabSz="342900" eaLnBrk="1" hangingPunct="1" latinLnBrk="0" marL="2400300" rtl="0">
-        <a:defRPr kern="1200" sz="1350">
+      <a:lvl8pPr marL="2400300" algn="l" defTabSz="342900" rtl="0" eaLnBrk="1" latinLnBrk="0" hangingPunct="1">
+        <a:defRPr sz="1350" kern="1200">
           <a:solidFill>
             <a:schemeClr val="tx1"/>
           </a:solidFill>
@@ -3065,8 +3066,8 @@
           <a:cs typeface="+mn-cs"/>
         </a:defRPr>
       </a:lvl8pPr>
-      <a:lvl9pPr algn="l" defTabSz="342900" eaLnBrk="1" hangingPunct="1" latinLnBrk="0" marL="2743200" rtl="0">
-        <a:defRPr kern="1200" sz="1350">
+      <a:lvl9pPr marL="2743200" algn="l" defTabSz="342900" rtl="0" eaLnBrk="1" latinLnBrk="0" hangingPunct="1">
+        <a:defRPr sz="1350" kern="1200">
           <a:solidFill>
             <a:schemeClr val="tx1"/>
           </a:solidFill>
@@ -3117,11 +3118,10 @@
           <a:bodyPr/>
           <a:lstStyle/>
           <a:p>
-            <a:pPr lvl="0" indent="0" marL="0">
+            <a:pPr marL="0" lvl="0" indent="0">
               <a:buNone/>
             </a:pPr>
             <a:r>
-              <a:rPr/>
               <a:t>Sleep Disorder</a:t>
             </a:r>
           </a:p>
@@ -3134,7 +3134,7 @@
             <a:spLocks noGrp="1"/>
           </p:cNvSpPr>
           <p:nvPr>
-            <p:ph idx="1" type="subTitle"/>
+            <p:ph type="subTitle" idx="1"/>
           </p:nvPr>
         </p:nvSpPr>
         <p:spPr>
@@ -3147,13 +3147,12 @@
           <a:bodyPr/>
           <a:lstStyle/>
           <a:p>
-            <a:pPr lvl="0" indent="0" marL="0">
+            <a:pPr marL="0" lvl="0" indent="0">
               <a:buNone/>
             </a:pPr>
             <a:br/>
             <a:br/>
             <a:r>
-              <a:rPr/>
               <a:t>Sarah Alshumayri, Reema Abdallah, Yehya Aseeri</a:t>
             </a:r>
           </a:p>
@@ -3166,19 +3165,18 @@
             <a:spLocks noGrp="1"/>
           </p:cNvSpPr>
           <p:nvPr>
-            <p:ph idx="10" sz="half" type="dt"/>
-          </p:nvPr>
-        </p:nvSpPr>
-        <p:spPr/>
-        <p:txBody>
-          <a:bodyPr/>
-          <a:lstStyle/>
-          <a:p>
-            <a:pPr lvl="0" indent="0" marL="0">
+            <p:ph type="dt" sz="half" idx="10"/>
+          </p:nvPr>
+        </p:nvSpPr>
+        <p:spPr/>
+        <p:txBody>
+          <a:bodyPr/>
+          <a:lstStyle/>
+          <a:p>
+            <a:pPr marL="0" lvl="0" indent="0">
               <a:buNone/>
             </a:pPr>
             <a:r>
-              <a:rPr/>
               <a:t>2023-11-18</a:t>
             </a:r>
           </a:p>
@@ -3186,6 +3184,9 @@
       </p:sp>
     </p:spTree>
   </p:cSld>
+  <p:clrMapOvr>
+    <a:masterClrMapping/>
+  </p:clrMapOvr>
 </p:sld>
 </file>
 
@@ -3221,11 +3222,10 @@
           <a:bodyPr/>
           <a:lstStyle/>
           <a:p>
-            <a:pPr lvl="0" indent="0" marL="0">
+            <a:pPr marL="0" lvl="0" indent="0">
               <a:buNone/>
             </a:pPr>
             <a:r>
-              <a:rPr/>
               <a:t>Problem Statement</a:t>
             </a:r>
           </a:p>
@@ -3243,30 +3243,33 @@
         </p:nvSpPr>
         <p:spPr/>
         <p:txBody>
-          <a:bodyPr/>
-          <a:lstStyle/>
-          <a:p>
-            <a:pPr lvl="0" indent="0" marL="0">
+          <a:bodyPr>
+            <a:normAutofit lnSpcReduction="10000"/>
+          </a:bodyPr>
+          <a:lstStyle/>
+          <a:p>
+            <a:pPr marL="0" lvl="0" indent="0">
               <a:buNone/>
             </a:pPr>
             <a:r>
-              <a:rPr/>
-              <a:t>“Exploring the Interplay Between Sleep, Health, and Lifestyle: A Data-Driven Approach”</a:t>
-            </a:r>
-          </a:p>
-          <a:p>
-            <a:pPr lvl="0" indent="0" marL="0">
+              <a:t>“Sleep Disorder Analysis: Unveiling the Interplay Between Lifestyle, Health, and Sleep Quality”</a:t>
+            </a:r>
+          </a:p>
+          <a:p>
+            <a:pPr marL="0" lvl="0" indent="0">
               <a:buNone/>
             </a:pPr>
             <a:r>
-              <a:rPr/>
-              <a:t>This project investigates the relationship between sleep patterns (efficiency, duration, stages) and various health and lifestyle factors (physical activity, stress, caffeine/alcohol consumption, sleep disorders), aiming to uncover correlations and insights into how these elements impact an individual’s sleep quality and overall well-being.</a:t>
+              <a:t>This project aims to delve into an extensive dataset comprising individual sleep patterns, health indicators, and lifestyle choices. Our objective is to uncover the complex relationships between these factors and their collective impact on sleep quality and disorders. The insights gained through this analysis could be pivotal in enhancing our understanding of sleep health and informing better lifestyle and health choices.</a:t>
             </a:r>
           </a:p>
         </p:txBody>
       </p:sp>
     </p:spTree>
   </p:cSld>
+  <p:clrMapOvr>
+    <a:masterClrMapping/>
+  </p:clrMapOvr>
 </p:sld>
 </file>
 
@@ -3297,21 +3300,15 @@
             <p:ph type="title"/>
           </p:nvPr>
         </p:nvSpPr>
-        <p:spPr>
-          <a:xfrm>
-            <a:off x="457201" y="204787"/>
-            <a:ext cx="3008313" cy="871538"/>
-          </a:xfrm>
-        </p:spPr>
-        <p:txBody>
-          <a:bodyPr/>
-          <a:lstStyle/>
-          <a:p>
-            <a:pPr lvl="0" indent="0" marL="0">
+        <p:spPr/>
+        <p:txBody>
+          <a:bodyPr/>
+          <a:lstStyle/>
+          <a:p>
+            <a:pPr marL="0" lvl="0" indent="0">
               <a:buNone/>
             </a:pPr>
             <a:r>
-              <a:rPr/>
               <a:t>Background</a:t>
             </a:r>
           </a:p>
@@ -3319,146 +3316,43 @@
       </p:sp>
       <p:sp>
         <p:nvSpPr>
-          <p:cNvPr id="4" name="Text Placeholder 3"/>
-          <p:cNvSpPr>
-            <a:spLocks noGrp="1"/>
-          </p:cNvSpPr>
-          <p:nvPr>
-            <p:ph idx="2" sz="half" type="body"/>
-          </p:nvPr>
-        </p:nvSpPr>
-        <p:spPr/>
-        <p:txBody>
-          <a:bodyPr/>
-          <a:lstStyle/>
-          <a:p>
-            <a:pPr lvl="0" indent="0" marL="0">
+          <p:cNvPr id="3" name="Content Placeholder 2"/>
+          <p:cNvSpPr>
+            <a:spLocks noGrp="1"/>
+          </p:cNvSpPr>
+          <p:nvPr>
+            <p:ph idx="1"/>
+          </p:nvPr>
+        </p:nvSpPr>
+        <p:spPr/>
+        <p:txBody>
+          <a:bodyPr>
+            <a:normAutofit fontScale="85000" lnSpcReduction="20000"/>
+          </a:bodyPr>
+          <a:lstStyle/>
+          <a:p>
+            <a:pPr marL="0" lvl="0" indent="0">
               <a:buNone/>
             </a:pPr>
             <a:r>
-              <a:rPr/>
               <a:t>Sleep is a critical component of overall health and well-being, yet it is often influenced by a myriad of factors ranging from lifestyle choices to health conditions. Understanding the dynamics of sleep and its relationship with different health and lifestyle factors can provide crucial insights for improving sleep quality and, by extension, overall health and life satisfaction.</a:t>
             </a:r>
           </a:p>
           <a:p>
-            <a:pPr lvl="0" indent="0" marL="0">
+            <a:pPr marL="0" lvl="0" indent="0">
               <a:buNone/>
             </a:pPr>
             <a:r>
-              <a:rPr/>
               <a:t>This project leverages data-driven analysis to explore these relationships. With datasets detailing sleep efficiency, stages of sleep, and other relevant sleep metrics, combined with data on physical activity, stress levels, BMI categories, and more, we can draw a comprehensive picture of the multifaceted nature of sleep in the context of contemporary lifestyles. This analysis can potentially lead to actionable recommendations for individuals seeking to improve their sleep and overall health.</a:t>
             </a:r>
           </a:p>
-          <a:p>
-            <a:pPr lvl="0" indent="0">
-              <a:buNone/>
-            </a:pPr>
-            <a:r>
-              <a:rPr>
-                <a:latin typeface="Courier"/>
-              </a:rPr>
-              <a:t>## 
-## Attaching package: 'dplyr'</a:t>
-            </a:r>
-          </a:p>
-          <a:p>
-            <a:pPr lvl="0" indent="0">
-              <a:buNone/>
-            </a:pPr>
-            <a:r>
-              <a:rPr>
-                <a:latin typeface="Courier"/>
-              </a:rPr>
-              <a:t>## The following objects are masked from 'package:stats':
-## 
-##     filter, lag</a:t>
-            </a:r>
-          </a:p>
-          <a:p>
-            <a:pPr lvl="0" indent="0">
-              <a:buNone/>
-            </a:pPr>
-            <a:r>
-              <a:rPr>
-                <a:latin typeface="Courier"/>
-              </a:rPr>
-              <a:t>## The following objects are masked from 'package:base':
-## 
-##     intersect, setdiff, setequal, union</a:t>
-            </a:r>
-          </a:p>
-          <a:p>
-            <a:pPr lvl="0" indent="0">
-              <a:buNone/>
-            </a:pPr>
-            <a:r>
-              <a:rPr>
-                <a:latin typeface="Courier"/>
-              </a:rPr>
-              <a:t>##    Person.ID         Gender               Age         Occupation       
-##  Min.   :  1.00   Length:374         Min.   :27.00   Length:374        
-##  1st Qu.: 94.25   Class :character   1st Qu.:35.25   Class :character  
-##  Median :187.50   Mode  :character   Median :43.00   Mode  :character  
-##  Mean   :187.50                      Mean   :42.18                     
-##  3rd Qu.:280.75                      3rd Qu.:50.00                     
-##  Max.   :374.00                      Max.   :59.00                     
-##  Sleep.Duration  Quality.of.Sleep Physical.Activity.Level  Stress.Level  
-##  Min.   :5.800   Min.   :4.000    Min.   :30.00           Min.   :3.000  
-##  1st Qu.:6.400   1st Qu.:6.000    1st Qu.:45.00           1st Qu.:4.000  
-##  Median :7.200   Median :7.000    Median :60.00           Median :5.000  
-##  Mean   :7.132   Mean   :7.313    Mean   :59.17           Mean   :5.385  
-##  3rd Qu.:7.800   3rd Qu.:8.000    3rd Qu.:75.00           3rd Qu.:7.000  
-##  Max.   :8.500   Max.   :9.000    Max.   :90.00           Max.   :8.000  
-##  BMI.Category       Blood.Pressure.1 Blood.Pressure.2   Heart.Rate   
-##  Length:374         Min.   :115.0    Min.   :75.00    Min.   :65.00  
-##  Class :character   1st Qu.:125.0    1st Qu.:80.00    1st Qu.:68.00  
-##  Mode  :character   Median :130.0    Median :85.00    Median :70.00  
-##                     Mean   :128.6    Mean   :84.65    Mean   :70.17  
-##                     3rd Qu.:135.0    3rd Qu.:90.00    3rd Qu.:72.00  
-##                     Max.   :142.0    Max.   :95.00    Max.   :86.00  
-##   Daily.Steps    Sleep.Disorder       BMI.Levels   
-##  Min.   : 3000   Length:374         Min.   :1.000  
-##  1st Qu.: 5600   Class :character   1st Qu.:1.000  
-##  Median : 7000   Mode  :character   Median :1.000  
-##  Mean   : 6817                      Mean   :1.449  
-##  3rd Qu.: 8000                      3rd Qu.:2.000  
-##  Max.   :10000                      Max.   :3.000</a:t>
-            </a:r>
-          </a:p>
-        </p:txBody>
-      </p:sp>
-      <p:pic>
-        <p:nvPicPr>
-          <p:cNvPr descr="Progress_Presentation_files/figure-pptx/unnamed-chunk-1-1.png" id="0" name="Picture 1"/>
-          <p:cNvPicPr>
-            <a:picLocks noGrp="1" noChangeAspect="1"/>
-          </p:cNvPicPr>
-          <p:nvPr/>
-        </p:nvPicPr>
-        <p:blipFill>
-          <a:blip r:embed="rId2"/>
-          <a:stretch>
-            <a:fillRect/>
-          </a:stretch>
-        </p:blipFill>
-        <p:spPr bwMode="auto">
-          <a:xfrm>
-            <a:off x="3568700" y="355600"/>
-            <a:ext cx="5105400" cy="4089400"/>
-          </a:xfrm>
-          <a:prstGeom prst="rect">
-            <a:avLst/>
-          </a:prstGeom>
-          <a:noFill/>
-          <a:ln w="9525">
-            <a:noFill/>
-            <a:headEnd/>
-            <a:tailEnd/>
-          </a:ln>
-        </p:spPr>
-      </p:pic>
+        </p:txBody>
+      </p:sp>
     </p:spTree>
   </p:cSld>
+  <p:clrMapOvr>
+    <a:masterClrMapping/>
+  </p:clrMapOvr>
 </p:sld>
 </file>
 
@@ -3494,11 +3388,10 @@
           <a:bodyPr/>
           <a:lstStyle/>
           <a:p>
-            <a:pPr lvl="0" indent="0" marL="0">
+            <a:pPr marL="0" lvl="0" indent="0">
               <a:buNone/>
             </a:pPr>
             <a:r>
-              <a:rPr/>
               <a:t>Methods Explored</a:t>
             </a:r>
           </a:p>
@@ -3519,11 +3412,10 @@
           <a:bodyPr/>
           <a:lstStyle/>
           <a:p>
-            <a:pPr lvl="0" indent="0" marL="0">
+            <a:pPr marL="0" lvl="0" indent="0">
               <a:buNone/>
             </a:pPr>
             <a:r>
-              <a:rPr/>
               <a:t>Reema’s part</a:t>
             </a:r>
           </a:p>
@@ -3531,6 +3423,9 @@
       </p:sp>
     </p:spTree>
   </p:cSld>
+  <p:clrMapOvr>
+    <a:masterClrMapping/>
+  </p:clrMapOvr>
 </p:sld>
 </file>
 
@@ -3566,11 +3461,10 @@
           <a:bodyPr/>
           <a:lstStyle/>
           <a:p>
-            <a:pPr lvl="0" indent="0" marL="0">
+            <a:pPr marL="0" lvl="0" indent="0">
               <a:buNone/>
             </a:pPr>
             <a:r>
-              <a:rPr/>
               <a:t>The Methods/Tools Used</a:t>
             </a:r>
           </a:p>
@@ -3591,11 +3485,10 @@
           <a:bodyPr/>
           <a:lstStyle/>
           <a:p>
-            <a:pPr lvl="0" indent="0" marL="0">
+            <a:pPr marL="0" lvl="0" indent="0">
               <a:buNone/>
             </a:pPr>
             <a:r>
-              <a:rPr/>
               <a:t>Yahya’s part</a:t>
             </a:r>
           </a:p>
@@ -3603,6 +3496,9 @@
       </p:sp>
     </p:spTree>
   </p:cSld>
+  <p:clrMapOvr>
+    <a:masterClrMapping/>
+  </p:clrMapOvr>
 </p:sld>
 </file>
 
@@ -3633,16 +3529,23 @@
             <p:ph type="title"/>
           </p:nvPr>
         </p:nvSpPr>
-        <p:spPr/>
-        <p:txBody>
-          <a:bodyPr/>
-          <a:lstStyle/>
-          <a:p>
-            <a:pPr lvl="0" indent="0" marL="0">
+        <p:spPr>
+          <a:xfrm>
+            <a:off x="457201" y="204787"/>
+            <a:ext cx="3008313" cy="871538"/>
+          </a:xfrm>
+        </p:spPr>
+        <p:txBody>
+          <a:bodyPr>
+            <a:normAutofit/>
+          </a:bodyPr>
+          <a:lstStyle/>
+          <a:p>
+            <a:pPr marL="0" lvl="0" indent="0">
               <a:buNone/>
             </a:pPr>
             <a:r>
-              <a:rPr/>
+              <a:rPr sz="1800" dirty="0"/>
               <a:t>Results</a:t>
             </a:r>
           </a:p>
@@ -3650,52 +3553,65 @@
       </p:sp>
       <p:sp>
         <p:nvSpPr>
-          <p:cNvPr id="3" name="Content Placeholder 2"/>
-          <p:cNvSpPr>
-            <a:spLocks noGrp="1"/>
-          </p:cNvSpPr>
-          <p:nvPr>
-            <p:ph idx="1"/>
-          </p:nvPr>
-        </p:nvSpPr>
-        <p:spPr/>
-        <p:txBody>
-          <a:bodyPr/>
-          <a:lstStyle/>
-          <a:p>
-            <a:pPr lvl="0" indent="0" marL="0">
+          <p:cNvPr id="4" name="Text Placeholder 3"/>
+          <p:cNvSpPr>
+            <a:spLocks noGrp="1"/>
+          </p:cNvSpPr>
+          <p:nvPr>
+            <p:ph type="body" sz="half" idx="2"/>
+          </p:nvPr>
+        </p:nvSpPr>
+        <p:spPr>
+          <a:xfrm>
+            <a:off x="457201" y="1076326"/>
+            <a:ext cx="7249885" cy="3518297"/>
+          </a:xfrm>
+        </p:spPr>
+        <p:txBody>
+          <a:bodyPr>
+            <a:normAutofit/>
+          </a:bodyPr>
+          <a:lstStyle/>
+          <a:p>
+            <a:pPr marL="0" lvl="0" indent="0">
               <a:buNone/>
             </a:pPr>
             <a:r>
-              <a:rPr/>
-              <a:t>Sarah’s Part</a:t>
-            </a:r>
-          </a:p>
-          <a:p>
-            <a:pPr lvl="0" indent="0" marL="0">
-              <a:spcBef>
-                <a:spcPts val="3000"/>
-              </a:spcBef>
+              <a:rPr sz="1200" b="1" dirty="0"/>
+              <a:t>Presenting Initial Findings or Data</a:t>
+            </a:r>
+            <a:r>
+              <a:rPr sz="1200" dirty="0"/>
+              <a:t> Our preliminary analysis, based on the cleaned and prepared data, has revealed significant insights into the correlation between sleep disorders and various lifestyle and health factors.</a:t>
+            </a:r>
+            <a:br>
+              <a:rPr lang="en-US" sz="1200" dirty="0"/>
+            </a:br>
+            <a:br>
+              <a:rPr lang="en-US" sz="1200" dirty="0"/>
+            </a:br>
+            <a:endParaRPr sz="1200" dirty="0"/>
+          </a:p>
+          <a:p>
+            <a:pPr marL="0" lvl="0" indent="0">
               <a:buNone/>
             </a:pPr>
             <a:r>
-              <a:rPr b="1"/>
-              <a:t>Further Results:</a:t>
-            </a:r>
-          </a:p>
-          <a:p>
-            <a:pPr lvl="0" indent="0" marL="0">
-              <a:buNone/>
-            </a:pPr>
-            <a:r>
-              <a:rPr/>
-              <a:t>Sarah’s Part</a:t>
+              <a:rPr sz="1200" b="1" dirty="0"/>
+              <a:t>Additional Results or Visualizations</a:t>
+            </a:r>
+            <a:r>
+              <a:rPr sz="1200" dirty="0"/>
+              <a:t> Building upon our initial findings, the following visualization provides an insight into the relationship between lifestyle choices and sleep quality.</a:t>
             </a:r>
           </a:p>
         </p:txBody>
       </p:sp>
     </p:spTree>
   </p:cSld>
+  <p:clrMapOvr>
+    <a:masterClrMapping/>
+  </p:clrMapOvr>
 </p:sld>
 </file>
 
@@ -3716,58 +3632,45 @@
           <a:chExt cx="0" cy="0"/>
         </a:xfrm>
       </p:grpSpPr>
-      <p:sp>
-        <p:nvSpPr>
-          <p:cNvPr id="2" name="Title 1"/>
-          <p:cNvSpPr>
-            <a:spLocks noGrp="1"/>
-          </p:cNvSpPr>
-          <p:nvPr>
-            <p:ph type="title"/>
-          </p:nvPr>
-        </p:nvSpPr>
-        <p:spPr/>
-        <p:txBody>
-          <a:bodyPr/>
-          <a:lstStyle/>
-          <a:p>
-            <a:pPr lvl="0" indent="0" marL="0">
-              <a:buNone/>
-            </a:pPr>
-            <a:r>
-              <a:rPr/>
-              <a:t>Lessons Learned</a:t>
-            </a:r>
-          </a:p>
-        </p:txBody>
-      </p:sp>
-      <p:sp>
-        <p:nvSpPr>
-          <p:cNvPr id="3" name="Content Placeholder 2"/>
-          <p:cNvSpPr>
-            <a:spLocks noGrp="1"/>
-          </p:cNvSpPr>
+      <p:pic>
+        <p:nvPicPr>
+          <p:cNvPr id="6" name="Content Placeholder 5" descr="A graph with a black background&#10;&#10;Description automatically generated">
+            <a:extLst>
+              <a:ext uri="{FF2B5EF4-FFF2-40B4-BE49-F238E27FC236}">
+                <a16:creationId xmlns:a16="http://schemas.microsoft.com/office/drawing/2014/main" id="{9DFBE795-0B10-6768-5DDC-C78B713A92F4}"/>
+              </a:ext>
+            </a:extLst>
+          </p:cNvPr>
+          <p:cNvPicPr>
+            <a:picLocks noGrp="1" noChangeAspect="1"/>
+          </p:cNvPicPr>
           <p:nvPr>
             <p:ph idx="1"/>
           </p:nvPr>
-        </p:nvSpPr>
-        <p:spPr/>
-        <p:txBody>
-          <a:bodyPr/>
-          <a:lstStyle/>
-          <a:p>
-            <a:pPr lvl="0" indent="0" marL="0">
-              <a:buNone/>
-            </a:pPr>
-            <a:r>
-              <a:rPr/>
-              <a:t>Reema’s part</a:t>
-            </a:r>
-          </a:p>
-        </p:txBody>
-      </p:sp>
+        </p:nvPicPr>
+        <p:blipFill>
+          <a:blip r:embed="rId2"/>
+          <a:stretch>
+            <a:fillRect/>
+          </a:stretch>
+        </p:blipFill>
+        <p:spPr>
+          <a:xfrm>
+            <a:off x="1869394" y="409666"/>
+            <a:ext cx="5405211" cy="4324168"/>
+          </a:xfrm>
+        </p:spPr>
+      </p:pic>
     </p:spTree>
+    <p:extLst>
+      <p:ext uri="{BB962C8B-B14F-4D97-AF65-F5344CB8AC3E}">
+        <p14:creationId xmlns:p14="http://schemas.microsoft.com/office/powerpoint/2010/main" val="249051456"/>
+      </p:ext>
+    </p:extLst>
   </p:cSld>
+  <p:clrMapOvr>
+    <a:masterClrMapping/>
+  </p:clrMapOvr>
 </p:sld>
 </file>
 
@@ -3803,12 +3706,11 @@
           <a:bodyPr/>
           <a:lstStyle/>
           <a:p>
-            <a:pPr lvl="0" indent="0" marL="0">
+            <a:pPr marL="0" lvl="0" indent="0">
               <a:buNone/>
             </a:pPr>
             <a:r>
-              <a:rPr/>
-              <a:t>Future Plans</a:t>
+              <a:t>Lessons Learned</a:t>
             </a:r>
           </a:p>
         </p:txBody>
@@ -3828,11 +3730,10 @@
           <a:bodyPr/>
           <a:lstStyle/>
           <a:p>
-            <a:pPr lvl="0" indent="0" marL="0">
+            <a:pPr marL="0" lvl="0" indent="0">
               <a:buNone/>
             </a:pPr>
             <a:r>
-              <a:rPr/>
               <a:t>Reema’s part</a:t>
             </a:r>
           </a:p>
@@ -3840,6 +3741,82 @@
       </p:sp>
     </p:spTree>
   </p:cSld>
+  <p:clrMapOvr>
+    <a:masterClrMapping/>
+  </p:clrMapOvr>
+</p:sld>
+</file>
+
+<file path=ppt/slides/slide9.xml><?xml version="1.0" encoding="utf-8"?>
+<p:sld xmlns:a="http://schemas.openxmlformats.org/drawingml/2006/main" xmlns:r="http://schemas.openxmlformats.org/officeDocument/2006/relationships" xmlns:p="http://schemas.openxmlformats.org/presentationml/2006/main">
+  <p:cSld>
+    <p:spTree>
+      <p:nvGrpSpPr>
+        <p:cNvPr id="1" name=""/>
+        <p:cNvGrpSpPr/>
+        <p:nvPr/>
+      </p:nvGrpSpPr>
+      <p:grpSpPr>
+        <a:xfrm>
+          <a:off x="0" y="0"/>
+          <a:ext cx="0" cy="0"/>
+          <a:chOff x="0" y="0"/>
+          <a:chExt cx="0" cy="0"/>
+        </a:xfrm>
+      </p:grpSpPr>
+      <p:sp>
+        <p:nvSpPr>
+          <p:cNvPr id="2" name="Title 1"/>
+          <p:cNvSpPr>
+            <a:spLocks noGrp="1"/>
+          </p:cNvSpPr>
+          <p:nvPr>
+            <p:ph type="title"/>
+          </p:nvPr>
+        </p:nvSpPr>
+        <p:spPr/>
+        <p:txBody>
+          <a:bodyPr/>
+          <a:lstStyle/>
+          <a:p>
+            <a:pPr marL="0" lvl="0" indent="0">
+              <a:buNone/>
+            </a:pPr>
+            <a:r>
+              <a:t>Future Plans</a:t>
+            </a:r>
+          </a:p>
+        </p:txBody>
+      </p:sp>
+      <p:sp>
+        <p:nvSpPr>
+          <p:cNvPr id="3" name="Content Placeholder 2"/>
+          <p:cNvSpPr>
+            <a:spLocks noGrp="1"/>
+          </p:cNvSpPr>
+          <p:nvPr>
+            <p:ph idx="1"/>
+          </p:nvPr>
+        </p:nvSpPr>
+        <p:spPr/>
+        <p:txBody>
+          <a:bodyPr/>
+          <a:lstStyle/>
+          <a:p>
+            <a:pPr marL="0" lvl="0" indent="0">
+              <a:buNone/>
+            </a:pPr>
+            <a:r>
+              <a:t>Reema’s part</a:t>
+            </a:r>
+          </a:p>
+        </p:txBody>
+      </p:sp>
+    </p:spTree>
+  </p:cSld>
+  <p:clrMapOvr>
+    <a:masterClrMapping/>
+  </p:clrMapOvr>
 </p:sld>
 </file>
 
@@ -4161,265 +4138,4 @@
   </a:objectDefaults>
   <a:extraClrSchemeLst/>
 </a:theme>
-</file>
-
-<file path=ppt/theme/theme2.xml><?xml version="1.0" encoding="utf-8"?>
-<a:theme xmlns:a="http://schemas.openxmlformats.org/drawingml/2006/main" name="Office Theme">
-  <a:themeElements>
-    <a:clrScheme name="Office">
-      <a:dk1>
-        <a:sysClr val="windowText" lastClr="000000"/>
-      </a:dk1>
-      <a:lt1>
-        <a:sysClr val="window" lastClr="FFFFFF"/>
-      </a:lt1>
-      <a:dk2>
-        <a:srgbClr val="44546A"/>
-      </a:dk2>
-      <a:lt2>
-        <a:srgbClr val="E7E6E6"/>
-      </a:lt2>
-      <a:accent1>
-        <a:srgbClr val="5B9BD5"/>
-      </a:accent1>
-      <a:accent2>
-        <a:srgbClr val="ED7D31"/>
-      </a:accent2>
-      <a:accent3>
-        <a:srgbClr val="A5A5A5"/>
-      </a:accent3>
-      <a:accent4>
-        <a:srgbClr val="FFC000"/>
-      </a:accent4>
-      <a:accent5>
-        <a:srgbClr val="4472C4"/>
-      </a:accent5>
-      <a:accent6>
-        <a:srgbClr val="70AD47"/>
-      </a:accent6>
-      <a:hlink>
-        <a:srgbClr val="0563C1"/>
-      </a:hlink>
-      <a:folHlink>
-        <a:srgbClr val="954F72"/>
-      </a:folHlink>
-    </a:clrScheme>
-    <a:fontScheme name="Office">
-      <a:majorFont>
-        <a:latin typeface="Calibri Light" panose="020F0302020204030204"/>
-        <a:ea typeface=""/>
-        <a:cs typeface=""/>
-        <a:font script="Jpan" typeface="ＭＳ Ｐゴシック"/>
-        <a:font script="Hang" typeface="맑은 고딕"/>
-        <a:font script="Hans" typeface="宋体"/>
-        <a:font script="Hant" typeface="新細明體"/>
-        <a:font script="Arab" typeface="Times New Roman"/>
-        <a:font script="Hebr" typeface="Times New Roman"/>
-        <a:font script="Thai" typeface="Angsana New"/>
-        <a:font script="Ethi" typeface="Nyala"/>
-        <a:font script="Beng" typeface="Vrinda"/>
-        <a:font script="Gujr" typeface="Shruti"/>
-        <a:font script="Khmr" typeface="MoolBoran"/>
-        <a:font script="Knda" typeface="Tunga"/>
-        <a:font script="Guru" typeface="Raavi"/>
-        <a:font script="Cans" typeface="Euphemia"/>
-        <a:font script="Cher" typeface="Plantagenet Cherokee"/>
-        <a:font script="Yiii" typeface="Microsoft Yi Baiti"/>
-        <a:font script="Tibt" typeface="Microsoft Himalaya"/>
-        <a:font script="Thaa" typeface="MV Boli"/>
-        <a:font script="Deva" typeface="Mangal"/>
-        <a:font script="Telu" typeface="Gautami"/>
-        <a:font script="Taml" typeface="Latha"/>
-        <a:font script="Syrc" typeface="Estrangelo Edessa"/>
-        <a:font script="Orya" typeface="Kalinga"/>
-        <a:font script="Mlym" typeface="Kartika"/>
-        <a:font script="Laoo" typeface="DokChampa"/>
-        <a:font script="Sinh" typeface="Iskoola Pota"/>
-        <a:font script="Mong" typeface="Mongolian Baiti"/>
-        <a:font script="Viet" typeface="Times New Roman"/>
-        <a:font script="Uigh" typeface="Microsoft Uighur"/>
-        <a:font script="Geor" typeface="Sylfaen"/>
-      </a:majorFont>
-      <a:minorFont>
-        <a:latin typeface="Calibri" panose="020F0502020204030204"/>
-        <a:ea typeface=""/>
-        <a:cs typeface=""/>
-        <a:font script="Jpan" typeface="ＭＳ Ｐゴシック"/>
-        <a:font script="Hang" typeface="맑은 고딕"/>
-        <a:font script="Hans" typeface="宋体"/>
-        <a:font script="Hant" typeface="新細明體"/>
-        <a:font script="Arab" typeface="Arial"/>
-        <a:font script="Hebr" typeface="Arial"/>
-        <a:font script="Thai" typeface="Cordia New"/>
-        <a:font script="Ethi" typeface="Nyala"/>
-        <a:font script="Beng" typeface="Vrinda"/>
-        <a:font script="Gujr" typeface="Shruti"/>
-        <a:font script="Khmr" typeface="DaunPenh"/>
-        <a:font script="Knda" typeface="Tunga"/>
-        <a:font script="Guru" typeface="Raavi"/>
-        <a:font script="Cans" typeface="Euphemia"/>
-        <a:font script="Cher" typeface="Plantagenet Cherokee"/>
-        <a:font script="Yiii" typeface="Microsoft Yi Baiti"/>
-        <a:font script="Tibt" typeface="Microsoft Himalaya"/>
-        <a:font script="Thaa" typeface="MV Boli"/>
-        <a:font script="Deva" typeface="Mangal"/>
-        <a:font script="Telu" typeface="Gautami"/>
-        <a:font script="Taml" typeface="Latha"/>
-        <a:font script="Syrc" typeface="Estrangelo Edessa"/>
-        <a:font script="Orya" typeface="Kalinga"/>
-        <a:font script="Mlym" typeface="Kartika"/>
-        <a:font script="Laoo" typeface="DokChampa"/>
-        <a:font script="Sinh" typeface="Iskoola Pota"/>
-        <a:font script="Mong" typeface="Mongolian Baiti"/>
-        <a:font script="Viet" typeface="Arial"/>
-        <a:font script="Uigh" typeface="Microsoft Uighur"/>
-        <a:font script="Geor" typeface="Sylfaen"/>
-      </a:minorFont>
-    </a:fontScheme>
-    <a:fmtScheme name="Office">
-      <a:fillStyleLst>
-        <a:solidFill>
-          <a:schemeClr val="phClr"/>
-        </a:solidFill>
-        <a:gradFill rotWithShape="1">
-          <a:gsLst>
-            <a:gs pos="0">
-              <a:schemeClr val="phClr">
-                <a:lumMod val="110000"/>
-                <a:satMod val="105000"/>
-                <a:tint val="67000"/>
-              </a:schemeClr>
-            </a:gs>
-            <a:gs pos="50000">
-              <a:schemeClr val="phClr">
-                <a:lumMod val="105000"/>
-                <a:satMod val="103000"/>
-                <a:tint val="73000"/>
-              </a:schemeClr>
-            </a:gs>
-            <a:gs pos="100000">
-              <a:schemeClr val="phClr">
-                <a:lumMod val="105000"/>
-                <a:satMod val="109000"/>
-                <a:tint val="81000"/>
-              </a:schemeClr>
-            </a:gs>
-          </a:gsLst>
-          <a:lin ang="5400000" scaled="0"/>
-        </a:gradFill>
-        <a:gradFill rotWithShape="1">
-          <a:gsLst>
-            <a:gs pos="0">
-              <a:schemeClr val="phClr">
-                <a:satMod val="103000"/>
-                <a:lumMod val="102000"/>
-                <a:tint val="94000"/>
-              </a:schemeClr>
-            </a:gs>
-            <a:gs pos="50000">
-              <a:schemeClr val="phClr">
-                <a:satMod val="110000"/>
-                <a:lumMod val="100000"/>
-                <a:shade val="100000"/>
-              </a:schemeClr>
-            </a:gs>
-            <a:gs pos="100000">
-              <a:schemeClr val="phClr">
-                <a:lumMod val="99000"/>
-                <a:satMod val="120000"/>
-                <a:shade val="78000"/>
-              </a:schemeClr>
-            </a:gs>
-          </a:gsLst>
-          <a:lin ang="5400000" scaled="0"/>
-        </a:gradFill>
-      </a:fillStyleLst>
-      <a:lnStyleLst>
-        <a:ln w="6350" cap="flat" cmpd="sng" algn="ctr">
-          <a:solidFill>
-            <a:schemeClr val="phClr"/>
-          </a:solidFill>
-          <a:prstDash val="solid"/>
-          <a:miter lim="800000"/>
-        </a:ln>
-        <a:ln w="12700" cap="flat" cmpd="sng" algn="ctr">
-          <a:solidFill>
-            <a:schemeClr val="phClr"/>
-          </a:solidFill>
-          <a:prstDash val="solid"/>
-          <a:miter lim="800000"/>
-        </a:ln>
-        <a:ln w="19050" cap="flat" cmpd="sng" algn="ctr">
-          <a:solidFill>
-            <a:schemeClr val="phClr"/>
-          </a:solidFill>
-          <a:prstDash val="solid"/>
-          <a:miter lim="800000"/>
-        </a:ln>
-      </a:lnStyleLst>
-      <a:effectStyleLst>
-        <a:effectStyle>
-          <a:effectLst/>
-        </a:effectStyle>
-        <a:effectStyle>
-          <a:effectLst/>
-        </a:effectStyle>
-        <a:effectStyle>
-          <a:effectLst>
-            <a:outerShdw blurRad="57150" dist="19050" dir="5400000" algn="ctr" rotWithShape="0">
-              <a:srgbClr val="000000">
-                <a:alpha val="63000"/>
-              </a:srgbClr>
-            </a:outerShdw>
-          </a:effectLst>
-        </a:effectStyle>
-      </a:effectStyleLst>
-      <a:bgFillStyleLst>
-        <a:solidFill>
-          <a:schemeClr val="phClr"/>
-        </a:solidFill>
-        <a:solidFill>
-          <a:schemeClr val="phClr">
-            <a:tint val="95000"/>
-            <a:satMod val="170000"/>
-          </a:schemeClr>
-        </a:solidFill>
-        <a:gradFill rotWithShape="1">
-          <a:gsLst>
-            <a:gs pos="0">
-              <a:schemeClr val="phClr">
-                <a:tint val="93000"/>
-                <a:satMod val="150000"/>
-                <a:shade val="98000"/>
-                <a:lumMod val="102000"/>
-              </a:schemeClr>
-            </a:gs>
-            <a:gs pos="50000">
-              <a:schemeClr val="phClr">
-                <a:tint val="98000"/>
-                <a:satMod val="130000"/>
-                <a:shade val="90000"/>
-                <a:lumMod val="103000"/>
-              </a:schemeClr>
-            </a:gs>
-            <a:gs pos="100000">
-              <a:schemeClr val="phClr">
-                <a:shade val="63000"/>
-                <a:satMod val="120000"/>
-              </a:schemeClr>
-            </a:gs>
-          </a:gsLst>
-          <a:lin ang="5400000" scaled="0"/>
-        </a:gradFill>
-      </a:bgFillStyleLst>
-    </a:fmtScheme>
-  </a:themeElements>
-  <a:objectDefaults/>
-  <a:extraClrSchemeLst/>
-  <a:extLst>
-    <a:ext uri="{05A4C25C-085E-4340-85A3-A5531E510DB2}">
-      <thm15:themeFamily xmlns:thm15="http://schemas.microsoft.com/office/thememl/2012/main" name="Office Theme" id="{62F939B6-93AF-4DB8-9C6B-D6C7DFDC589F}" vid="{4A3C46E8-61CC-4603-A589-7422A47A8E4A}"/>
-    </a:ext>
-  </a:extLst>
-</a:theme>
 </file>
</xml_diff>